<commit_message>
added new Design Strategies to Common Slides.pptx
</commit_message>
<xml_diff>
--- a/Slides/Common Slides.pptx
+++ b/Slides/Common Slides.pptx
@@ -5,7 +5,7 @@
     <p:sldMasterId id="2147483648" r:id="rId1"/>
   </p:sldMasterIdLst>
   <p:notesMasterIdLst>
-    <p:notesMasterId r:id="rId34"/>
+    <p:notesMasterId r:id="rId33"/>
   </p:notesMasterIdLst>
   <p:sldIdLst>
     <p:sldId id="285" r:id="rId2"/>
@@ -30,21 +30,20 @@
     <p:sldId id="279" r:id="rId21"/>
     <p:sldId id="280" r:id="rId22"/>
     <p:sldId id="281" r:id="rId23"/>
-    <p:sldId id="270" r:id="rId24"/>
-    <p:sldId id="271" r:id="rId25"/>
-    <p:sldId id="284" r:id="rId26"/>
-    <p:sldId id="277" r:id="rId27"/>
-    <p:sldId id="273" r:id="rId28"/>
-    <p:sldId id="274" r:id="rId29"/>
-    <p:sldId id="276" r:id="rId30"/>
-    <p:sldId id="278" r:id="rId31"/>
-    <p:sldId id="282" r:id="rId32"/>
-    <p:sldId id="283" r:id="rId33"/>
+    <p:sldId id="299" r:id="rId24"/>
+    <p:sldId id="284" r:id="rId25"/>
+    <p:sldId id="277" r:id="rId26"/>
+    <p:sldId id="273" r:id="rId27"/>
+    <p:sldId id="274" r:id="rId28"/>
+    <p:sldId id="276" r:id="rId29"/>
+    <p:sldId id="278" r:id="rId30"/>
+    <p:sldId id="282" r:id="rId31"/>
+    <p:sldId id="283" r:id="rId32"/>
   </p:sldIdLst>
   <p:sldSz cx="9144000" cy="6858000" type="screen4x3"/>
   <p:notesSz cx="6858000" cy="9144000"/>
   <p:custDataLst>
-    <p:tags r:id="rId35"/>
+    <p:tags r:id="rId34"/>
   </p:custDataLst>
   <p:defaultTextStyle>
     <a:defPPr>
@@ -242,7 +241,7 @@
           <a:p>
             <a:fld id="{03B24962-D7B5-4FEA-ABE9-8C89DFE85AA1}" type="datetimeFigureOut">
               <a:rPr lang="en-US" smtClean="0"/>
-              <a:t>7/29/2015</a:t>
+              <a:t>7/31/2015</a:t>
             </a:fld>
             <a:endParaRPr lang="en-US"/>
           </a:p>
@@ -851,7 +850,7 @@
     </p:spTree>
     <p:extLst>
       <p:ext uri="{BB962C8B-B14F-4D97-AF65-F5344CB8AC3E}">
-        <p14:creationId xmlns:p14="http://schemas.microsoft.com/office/powerpoint/2010/main" val="1112017648"/>
+        <p14:creationId xmlns:p14="http://schemas.microsoft.com/office/powerpoint/2010/main" val="2121378705"/>
       </p:ext>
     </p:extLst>
   </p:cSld>
@@ -940,7 +939,7 @@
     </p:spTree>
     <p:extLst>
       <p:ext uri="{BB962C8B-B14F-4D97-AF65-F5344CB8AC3E}">
-        <p14:creationId xmlns:p14="http://schemas.microsoft.com/office/powerpoint/2010/main" val="1670888686"/>
+        <p14:creationId xmlns:p14="http://schemas.microsoft.com/office/powerpoint/2010/main" val="975264587"/>
       </p:ext>
     </p:extLst>
   </p:cSld>
@@ -994,11 +993,7 @@
           <a:bodyPr/>
           <a:lstStyle/>
           <a:p>
-            <a:r>
-              <a:rPr lang="en-US" dirty="0" smtClean="0"/>
-              <a:t>Here is the function design recipe.  </a:t>
-            </a:r>
-            <a:endParaRPr lang="en-US" dirty="0"/>
+            <a:endParaRPr lang="en-US"/>
           </a:p>
         </p:txBody>
       </p:sp>
@@ -1017,10 +1012,10 @@
           <a:bodyPr/>
           <a:lstStyle/>
           <a:p>
-            <a:fld id="{6048B3DE-E9CD-4720-84B6-E24D30E64DE7}" type="slidenum">
+            <a:fld id="{35B728A6-6F57-4E84-A2C2-C78EE294E18B}" type="slidenum">
               <a:rPr lang="en-US" smtClean="0"/>
               <a:pPr/>
-              <a:t>25</a:t>
+              <a:t>26</a:t>
             </a:fld>
             <a:endParaRPr lang="en-US"/>
           </a:p>
@@ -1029,7 +1024,7 @@
     </p:spTree>
     <p:extLst>
       <p:ext uri="{BB962C8B-B14F-4D97-AF65-F5344CB8AC3E}">
-        <p14:creationId xmlns:p14="http://schemas.microsoft.com/office/powerpoint/2010/main" val="975264587"/>
+        <p14:creationId xmlns:p14="http://schemas.microsoft.com/office/powerpoint/2010/main" val="3948205762"/>
       </p:ext>
     </p:extLst>
   </p:cSld>
@@ -1083,91 +1078,6 @@
           <a:bodyPr/>
           <a:lstStyle/>
           <a:p>
-            <a:endParaRPr lang="en-US"/>
-          </a:p>
-        </p:txBody>
-      </p:sp>
-      <p:sp>
-        <p:nvSpPr>
-          <p:cNvPr id="4" name="Slide Number Placeholder 3"/>
-          <p:cNvSpPr>
-            <a:spLocks noGrp="1"/>
-          </p:cNvSpPr>
-          <p:nvPr>
-            <p:ph type="sldNum" sz="quarter" idx="10"/>
-          </p:nvPr>
-        </p:nvSpPr>
-        <p:spPr/>
-        <p:txBody>
-          <a:bodyPr/>
-          <a:lstStyle/>
-          <a:p>
-            <a:fld id="{35B728A6-6F57-4E84-A2C2-C78EE294E18B}" type="slidenum">
-              <a:rPr lang="en-US" smtClean="0"/>
-              <a:pPr/>
-              <a:t>27</a:t>
-            </a:fld>
-            <a:endParaRPr lang="en-US"/>
-          </a:p>
-        </p:txBody>
-      </p:sp>
-    </p:spTree>
-    <p:extLst>
-      <p:ext uri="{BB962C8B-B14F-4D97-AF65-F5344CB8AC3E}">
-        <p14:creationId xmlns:p14="http://schemas.microsoft.com/office/powerpoint/2010/main" val="3948205762"/>
-      </p:ext>
-    </p:extLst>
-  </p:cSld>
-  <p:clrMapOvr>
-    <a:masterClrMapping/>
-  </p:clrMapOvr>
-</p:notes>
-</file>
-
-<file path=ppt/notesSlides/notesSlide16.xml><?xml version="1.0" encoding="utf-8"?>
-<p:notes xmlns:a="http://schemas.openxmlformats.org/drawingml/2006/main" xmlns:r="http://schemas.openxmlformats.org/officeDocument/2006/relationships" xmlns:p="http://schemas.openxmlformats.org/presentationml/2006/main">
-  <p:cSld>
-    <p:spTree>
-      <p:nvGrpSpPr>
-        <p:cNvPr id="1" name=""/>
-        <p:cNvGrpSpPr/>
-        <p:nvPr/>
-      </p:nvGrpSpPr>
-      <p:grpSpPr>
-        <a:xfrm>
-          <a:off x="0" y="0"/>
-          <a:ext cx="0" cy="0"/>
-          <a:chOff x="0" y="0"/>
-          <a:chExt cx="0" cy="0"/>
-        </a:xfrm>
-      </p:grpSpPr>
-      <p:sp>
-        <p:nvSpPr>
-          <p:cNvPr id="2" name="Slide Image Placeholder 1"/>
-          <p:cNvSpPr>
-            <a:spLocks noGrp="1" noRot="1" noChangeAspect="1"/>
-          </p:cNvSpPr>
-          <p:nvPr>
-            <p:ph type="sldImg"/>
-          </p:nvPr>
-        </p:nvSpPr>
-        <p:spPr/>
-      </p:sp>
-      <p:sp>
-        <p:nvSpPr>
-          <p:cNvPr id="3" name="Notes Placeholder 2"/>
-          <p:cNvSpPr>
-            <a:spLocks noGrp="1"/>
-          </p:cNvSpPr>
-          <p:nvPr>
-            <p:ph type="body" idx="1"/>
-          </p:nvPr>
-        </p:nvSpPr>
-        <p:spPr/>
-        <p:txBody>
-          <a:bodyPr/>
-          <a:lstStyle/>
-          <a:p>
             <a:r>
               <a:rPr lang="en-US" dirty="0" smtClean="0"/>
               <a:t>Here is another set of our favorite</a:t>
@@ -1198,7 +1108,7 @@
             <a:fld id="{35B728A6-6F57-4E84-A2C2-C78EE294E18B}" type="slidenum">
               <a:rPr lang="en-US" smtClean="0"/>
               <a:pPr/>
-              <a:t>30</a:t>
+              <a:t>29</a:t>
             </a:fld>
             <a:endParaRPr lang="en-US"/>
           </a:p>
@@ -2092,7 +2002,7 @@
           <a:p>
             <a:fld id="{2F1F79F5-7BEC-496A-AFC7-876E38F64D71}" type="datetime1">
               <a:rPr lang="en-US" smtClean="0"/>
-              <a:t>7/29/2015</a:t>
+              <a:t>7/31/2015</a:t>
             </a:fld>
             <a:endParaRPr lang="en-US"/>
           </a:p>
@@ -2194,7 +2104,7 @@
           <a:p>
             <a:fld id="{0A05703A-7669-4FEA-9056-25299B4D29D4}" type="datetime1">
               <a:rPr lang="en-US" smtClean="0"/>
-              <a:t>7/29/2015</a:t>
+              <a:t>7/31/2015</a:t>
             </a:fld>
             <a:endParaRPr lang="en-US"/>
           </a:p>
@@ -2471,7 +2381,7 @@
           <a:p>
             <a:fld id="{6E5077B5-BB57-49DB-88CA-226A139E5C01}" type="datetime1">
               <a:rPr lang="en-US" smtClean="0"/>
-              <a:t>7/29/2015</a:t>
+              <a:t>7/31/2015</a:t>
             </a:fld>
             <a:endParaRPr lang="en-US"/>
           </a:p>
@@ -2724,7 +2634,7 @@
           <a:p>
             <a:fld id="{C48D9447-CBD6-49A1-89FD-8512A8CF8999}" type="datetime1">
               <a:rPr lang="en-US" smtClean="0"/>
-              <a:t>7/29/2015</a:t>
+              <a:t>7/31/2015</a:t>
             </a:fld>
             <a:endParaRPr lang="en-US"/>
           </a:p>
@@ -2894,7 +2804,7 @@
           <a:p>
             <a:fld id="{A3639A2A-823D-48B7-9ACE-7FAF42870BA9}" type="datetime1">
               <a:rPr lang="en-US" smtClean="0"/>
-              <a:t>7/29/2015</a:t>
+              <a:t>7/31/2015</a:t>
             </a:fld>
             <a:endParaRPr lang="en-US"/>
           </a:p>
@@ -3074,7 +2984,7 @@
           <a:p>
             <a:fld id="{ED1B6996-82E9-463C-972C-7B56056E426C}" type="datetime1">
               <a:rPr lang="en-US" smtClean="0"/>
-              <a:t>7/29/2015</a:t>
+              <a:t>7/31/2015</a:t>
             </a:fld>
             <a:endParaRPr lang="en-US"/>
           </a:p>
@@ -3244,7 +3154,7 @@
           <a:p>
             <a:fld id="{E22ED4DA-448D-4BB1-B935-CC112220207B}" type="datetime1">
               <a:rPr lang="en-US" smtClean="0"/>
-              <a:t>7/29/2015</a:t>
+              <a:t>7/31/2015</a:t>
             </a:fld>
             <a:endParaRPr lang="en-US"/>
           </a:p>
@@ -3426,7 +3336,7 @@
           <a:p>
             <a:fld id="{E22ED4DA-448D-4BB1-B935-CC112220207B}" type="datetime1">
               <a:rPr lang="en-US" smtClean="0"/>
-              <a:t>7/29/2015</a:t>
+              <a:t>7/31/2015</a:t>
             </a:fld>
             <a:endParaRPr lang="en-US"/>
           </a:p>
@@ -3695,7 +3605,7 @@
           <a:p>
             <a:fld id="{FF5D65A6-AB94-4435-B0B7-3743215FA46C}" type="datetime1">
               <a:rPr lang="en-US" smtClean="0"/>
-              <a:t>7/29/2015</a:t>
+              <a:t>7/31/2015</a:t>
             </a:fld>
             <a:endParaRPr lang="en-US"/>
           </a:p>
@@ -3880,7 +3790,7 @@
           <a:p>
             <a:fld id="{FF5D65A6-AB94-4435-B0B7-3743215FA46C}" type="datetime1">
               <a:rPr lang="en-US" smtClean="0"/>
-              <a:t>7/29/2015</a:t>
+              <a:t>7/31/2015</a:t>
             </a:fld>
             <a:endParaRPr lang="en-US"/>
           </a:p>
@@ -4182,7 +4092,7 @@
           <a:p>
             <a:fld id="{7C193DC4-6EF0-48C9-B29C-616106A645E1}" type="datetime1">
               <a:rPr lang="en-US" smtClean="0"/>
-              <a:t>7/29/2015</a:t>
+              <a:t>7/31/2015</a:t>
             </a:fld>
             <a:endParaRPr lang="en-US"/>
           </a:p>
@@ -4470,7 +4380,7 @@
           <a:p>
             <a:fld id="{5D1846AD-9252-4647-9435-4C2AC365653A}" type="datetime1">
               <a:rPr lang="en-US" smtClean="0"/>
-              <a:t>7/29/2015</a:t>
+              <a:t>7/31/2015</a:t>
             </a:fld>
             <a:endParaRPr lang="en-US"/>
           </a:p>
@@ -4892,7 +4802,7 @@
           <a:p>
             <a:fld id="{CE56DC10-3561-4063-A6AF-C1CC7A41040A}" type="datetime1">
               <a:rPr lang="en-US" smtClean="0"/>
-              <a:t>7/29/2015</a:t>
+              <a:t>7/31/2015</a:t>
             </a:fld>
             <a:endParaRPr lang="en-US"/>
           </a:p>
@@ -5010,7 +4920,7 @@
           <a:p>
             <a:fld id="{2F7B77F5-1464-4F6B-92A8-64FC8A508293}" type="datetime1">
               <a:rPr lang="en-US" smtClean="0"/>
-              <a:t>7/29/2015</a:t>
+              <a:t>7/31/2015</a:t>
             </a:fld>
             <a:endParaRPr lang="en-US"/>
           </a:p>
@@ -5230,7 +5140,7 @@
           <a:p>
             <a:fld id="{02B3F677-983B-48DB-ADFD-63FE6CBC7FB2}" type="datetime1">
               <a:rPr lang="en-US" smtClean="0"/>
-              <a:t>7/29/2015</a:t>
+              <a:t>7/31/2015</a:t>
             </a:fld>
             <a:endParaRPr lang="en-US"/>
           </a:p>
@@ -5755,8 +5665,9 @@
               </a:r>
               <a:r>
                 <a:rPr lang="en-US" sz="1000" dirty="0" smtClean="0"/>
-                <a:t>2012-2014</a:t>
+                <a:t>2012-2015</a:t>
               </a:r>
+              <a:endParaRPr lang="en-US" sz="1000" dirty="0" smtClean="0"/>
             </a:p>
             <a:p>
               <a:r>
@@ -6151,14 +6062,14 @@
             <p:ph idx="1"/>
             <p:extLst>
               <p:ext uri="{D42A27DB-BD31-4B8C-83A1-F6EECF244321}">
-                <p14:modId xmlns:p14="http://schemas.microsoft.com/office/powerpoint/2010/main" val="2205153390"/>
+                <p14:modId xmlns:p14="http://schemas.microsoft.com/office/powerpoint/2010/main" val="556871473"/>
               </p:ext>
             </p:extLst>
           </p:nvPr>
         </p:nvGraphicFramePr>
         <p:xfrm>
           <a:off x="457200" y="914400"/>
-          <a:ext cx="8229600" cy="6736080"/>
+          <a:ext cx="8229600" cy="4511040"/>
         </p:xfrm>
         <a:graphic>
           <a:graphicData uri="http://schemas.openxmlformats.org/drawingml/2006/table">
@@ -6178,11 +6089,7 @@
                       <a:pPr algn="ctr"/>
                       <a:r>
                         <a:rPr lang="en-US" sz="8000" dirty="0" smtClean="0"/>
-                        <a:t>The </a:t>
-                      </a:r>
-                      <a:r>
-                        <a:rPr lang="en-US" sz="8000" dirty="0" smtClean="0"/>
-                        <a:t>Point</a:t>
+                        <a:t>The Point</a:t>
                       </a:r>
                       <a:endParaRPr lang="en-US" sz="8000" dirty="0"/>
                     </a:p>
@@ -6198,11 +6105,7 @@
                     <a:p>
                       <a:r>
                         <a:rPr lang="en-US" sz="3200" dirty="0" smtClean="0"/>
-                        <a:t>1. </a:t>
-                      </a:r>
-                      <a:r>
-                        <a:rPr lang="en-US" sz="3200" dirty="0" smtClean="0"/>
-                        <a:t>It’s not calculus.</a:t>
+                        <a:t>1. It’s not calculus.</a:t>
                       </a:r>
                       <a:r>
                         <a:rPr lang="en-US" sz="3200" baseline="0" dirty="0" smtClean="0"/>
@@ -6235,11 +6138,7 @@
                     <a:p>
                       <a:r>
                         <a:rPr lang="en-US" sz="3200" dirty="0" smtClean="0"/>
-                        <a:t>2. </a:t>
-                      </a:r>
-                      <a:r>
-                        <a:rPr lang="en-US" sz="3200" dirty="0" smtClean="0"/>
-                        <a:t>The goal</a:t>
+                        <a:t>2. The goal</a:t>
                       </a:r>
                       <a:r>
                         <a:rPr lang="en-US" sz="3200" baseline="0" dirty="0" smtClean="0"/>
@@ -6293,63 +6192,7 @@
                       </a:r>
                       <a:r>
                         <a:rPr lang="en-US" sz="3200" baseline="0" dirty="0" smtClean="0"/>
-                        <a:t> </a:t>
-                      </a:r>
-                      <a:r>
-                        <a:rPr lang="en-US" sz="3200" baseline="0" dirty="0" smtClean="0"/>
-                        <a:t>A beautiful program is one that is readable, understandable, and modifiable by people.</a:t>
-                      </a:r>
-                      <a:endParaRPr lang="en-US" sz="3200" dirty="0"/>
-                    </a:p>
-                  </a:txBody>
-                  <a:tcPr/>
-                </a:tc>
-              </a:tr>
-              <a:tr h="370840">
-                <a:tc>
-                  <a:txBody>
-                    <a:bodyPr/>
-                    <a:lstStyle/>
-                    <a:p>
-                      <a:r>
-                        <a:rPr lang="en-US" sz="3200" dirty="0" smtClean="0"/>
-                        <a:t>4. Design Functions</a:t>
-                      </a:r>
-                      <a:r>
-                        <a:rPr lang="en-US" sz="3200" baseline="0" dirty="0" smtClean="0"/>
-                        <a:t> Systematically</a:t>
-                      </a:r>
-                      <a:endParaRPr lang="en-US" sz="3200" dirty="0" smtClean="0"/>
-                    </a:p>
-                  </a:txBody>
-                  <a:tcPr/>
-                </a:tc>
-              </a:tr>
-              <a:tr h="370840">
-                <a:tc>
-                  <a:txBody>
-                    <a:bodyPr/>
-                    <a:lstStyle/>
-                    <a:p>
-                      <a:r>
-                        <a:rPr lang="en-US" sz="3200" dirty="0" smtClean="0"/>
-                        <a:t>5. Design Systems Iteratively</a:t>
-                      </a:r>
-                      <a:endParaRPr lang="en-US" sz="3200" dirty="0"/>
-                    </a:p>
-                  </a:txBody>
-                  <a:tcPr/>
-                </a:tc>
-              </a:tr>
-              <a:tr h="370840">
-                <a:tc>
-                  <a:txBody>
-                    <a:bodyPr/>
-                    <a:lstStyle/>
-                    <a:p>
-                      <a:r>
-                        <a:rPr lang="en-US" sz="3200" dirty="0" smtClean="0"/>
-                        <a:t>6. Pass values when you can, share state only when you must.</a:t>
+                        <a:t> A beautiful program is one that is readable, understandable, and modifiable by people.</a:t>
                       </a:r>
                       <a:endParaRPr lang="en-US" sz="3200" dirty="0"/>
                     </a:p>
@@ -6431,14 +6274,14 @@
             <p:ph idx="1"/>
             <p:extLst>
               <p:ext uri="{D42A27DB-BD31-4B8C-83A1-F6EECF244321}">
-                <p14:modId xmlns:p14="http://schemas.microsoft.com/office/powerpoint/2010/main" val="4193479512"/>
+                <p14:modId xmlns:p14="http://schemas.microsoft.com/office/powerpoint/2010/main" val="1840296809"/>
               </p:ext>
             </p:extLst>
           </p:nvPr>
         </p:nvGraphicFramePr>
         <p:xfrm>
           <a:off x="457200" y="914400"/>
-          <a:ext cx="8229600" cy="5516880"/>
+          <a:ext cx="8229600" cy="6004560"/>
         </p:xfrm>
         <a:graphic>
           <a:graphicData uri="http://schemas.openxmlformats.org/drawingml/2006/table">
@@ -6458,7 +6301,7 @@
                       <a:pPr algn="ctr"/>
                       <a:r>
                         <a:rPr lang="en-US" sz="3200" dirty="0" smtClean="0"/>
-                        <a:t>The Six Principles of this course</a:t>
+                        <a:t>How to write beautiful programs</a:t>
                       </a:r>
                       <a:endParaRPr lang="en-US" sz="3200" dirty="0"/>
                     </a:p>
@@ -6474,7 +6317,23 @@
                     <a:p>
                       <a:r>
                         <a:rPr lang="en-US" sz="3200" dirty="0" smtClean="0"/>
-                        <a:t>1. Programming is a People Discipline</a:t>
+                        <a:t>1. </a:t>
+                      </a:r>
+                      <a:r>
+                        <a:rPr lang="en-US" sz="3200" dirty="0" smtClean="0"/>
+                        <a:t>Always</a:t>
+                      </a:r>
+                      <a:r>
+                        <a:rPr lang="en-US" sz="3200" baseline="0" dirty="0" smtClean="0"/>
+                        <a:t> remember: </a:t>
+                      </a:r>
+                      <a:r>
+                        <a:rPr lang="en-US" sz="3200" dirty="0" smtClean="0"/>
+                        <a:t>Programming </a:t>
+                      </a:r>
+                      <a:r>
+                        <a:rPr lang="en-US" sz="3200" dirty="0" smtClean="0"/>
+                        <a:t>is a People Discipline</a:t>
                       </a:r>
                       <a:endParaRPr lang="en-US" sz="3200" dirty="0"/>
                     </a:p>
@@ -10250,6 +10109,13 @@
   <p:clrMapOvr>
     <a:masterClrMapping/>
   </p:clrMapOvr>
+  <p:timing>
+    <p:tnLst>
+      <p:par>
+        <p:cTn id="1" dur="indefinite" restart="never" nodeType="tmRoot"/>
+      </p:par>
+    </p:tnLst>
+  </p:timing>
 </p:sld>
 </file>
 
@@ -11524,7 +11390,11 @@
           <a:p>
             <a:r>
               <a:rPr lang="en-US" dirty="0" smtClean="0"/>
-              <a:t>The Program Design Strategies</a:t>
+              <a:t>Typical </a:t>
+            </a:r>
+            <a:r>
+              <a:rPr lang="en-US" dirty="0" smtClean="0"/>
+              <a:t>Program Design Strategies</a:t>
             </a:r>
             <a:endParaRPr lang="en-US" dirty="0"/>
           </a:p>
@@ -11540,7 +11410,7 @@
             <p:ph idx="1"/>
             <p:extLst>
               <p:ext uri="{D42A27DB-BD31-4B8C-83A1-F6EECF244321}">
-                <p14:modId xmlns:p14="http://schemas.microsoft.com/office/powerpoint/2010/main" val="1116993691"/>
+                <p14:modId xmlns:p14="http://schemas.microsoft.com/office/powerpoint/2010/main" val="1739459713"/>
               </p:ext>
             </p:extLst>
           </p:nvPr>
@@ -11583,7 +11453,15 @@
                     <a:p>
                       <a:r>
                         <a:rPr lang="en-US" sz="3200" dirty="0" smtClean="0"/>
-                        <a:t>1. Function Composition</a:t>
+                        <a:t>1. </a:t>
+                      </a:r>
+                      <a:r>
+                        <a:rPr lang="en-US" sz="3200" dirty="0" smtClean="0"/>
+                        <a:t>Combine</a:t>
+                      </a:r>
+                      <a:r>
+                        <a:rPr lang="en-US" sz="3200" baseline="0" dirty="0" smtClean="0"/>
+                        <a:t> simpler functions</a:t>
                       </a:r>
                       <a:endParaRPr lang="en-US" sz="3200" dirty="0"/>
                     </a:p>
@@ -11599,8 +11477,33 @@
                     <a:p>
                       <a:r>
                         <a:rPr lang="en-US" sz="3200" dirty="0" smtClean="0"/>
-                        <a:t>2. Structural Decomposition</a:t>
-                      </a:r>
+                        <a:t>2</a:t>
+                      </a:r>
+                      <a:r>
+                        <a:rPr lang="en-US" sz="3200" dirty="0" smtClean="0"/>
+                        <a:t>.</a:t>
+                      </a:r>
+                      <a:r>
+                        <a:rPr lang="en-US" sz="3200" baseline="0" dirty="0" smtClean="0"/>
+                        <a:t> Use template for &lt;data </a:t>
+                      </a:r>
+                      <a:r>
+                        <a:rPr lang="en-US" sz="3200" baseline="0" dirty="0" err="1" smtClean="0"/>
+                        <a:t>def</a:t>
+                      </a:r>
+                      <a:r>
+                        <a:rPr lang="en-US" sz="3200" baseline="0" dirty="0" smtClean="0"/>
+                        <a:t>&gt; on &lt;</a:t>
+                      </a:r>
+                      <a:r>
+                        <a:rPr lang="en-US" sz="3200" baseline="0" dirty="0" err="1" smtClean="0"/>
+                        <a:t>vble</a:t>
+                      </a:r>
+                      <a:r>
+                        <a:rPr lang="en-US" sz="3200" baseline="0" dirty="0" smtClean="0"/>
+                        <a:t>&gt;</a:t>
+                      </a:r>
+                      <a:endParaRPr lang="en-US" sz="3200" dirty="0" smtClean="0"/>
                     </a:p>
                   </a:txBody>
                   <a:tcPr/>
@@ -11614,7 +11517,11 @@
                     <a:p>
                       <a:r>
                         <a:rPr lang="en-US" sz="3200" dirty="0" smtClean="0"/>
-                        <a:t>3. Generalization</a:t>
+                        <a:t>3. </a:t>
+                      </a:r>
+                      <a:r>
+                        <a:rPr lang="en-US" sz="3200" dirty="0" smtClean="0"/>
+                        <a:t>Divide into cases on &lt;condition&gt;</a:t>
                       </a:r>
                       <a:endParaRPr lang="en-US" sz="3200" dirty="0"/>
                     </a:p>
@@ -11630,7 +11537,27 @@
                     <a:p>
                       <a:r>
                         <a:rPr lang="en-US" sz="3200" dirty="0" smtClean="0"/>
-                        <a:t>4. General Recursion</a:t>
+                        <a:t>4. </a:t>
+                      </a:r>
+                      <a:r>
+                        <a:rPr lang="en-US" sz="3200" dirty="0" smtClean="0"/>
+                        <a:t>Use HOF &lt;</a:t>
+                      </a:r>
+                      <a:r>
+                        <a:rPr lang="en-US" sz="3200" dirty="0" err="1" smtClean="0"/>
+                        <a:t>mapfn</a:t>
+                      </a:r>
+                      <a:r>
+                        <a:rPr lang="en-US" sz="3200" dirty="0" smtClean="0"/>
+                        <a:t>&gt; on &lt;</a:t>
+                      </a:r>
+                      <a:r>
+                        <a:rPr lang="en-US" sz="3200" dirty="0" err="1" smtClean="0"/>
+                        <a:t>vble</a:t>
+                      </a:r>
+                      <a:r>
+                        <a:rPr lang="en-US" sz="3200" dirty="0" smtClean="0"/>
+                        <a:t>&gt;</a:t>
                       </a:r>
                       <a:endParaRPr lang="en-US" sz="3200" dirty="0"/>
                     </a:p>
@@ -11646,11 +11573,11 @@
                     <a:p>
                       <a:r>
                         <a:rPr lang="en-US" sz="3200" dirty="0" smtClean="0"/>
-                        <a:t>5. Communication</a:t>
-                      </a:r>
-                      <a:r>
-                        <a:rPr lang="en-US" sz="3200" baseline="0" dirty="0" smtClean="0"/>
-                        <a:t> via State</a:t>
+                        <a:t>5. </a:t>
+                      </a:r>
+                      <a:r>
+                        <a:rPr lang="en-US" sz="3200" dirty="0" smtClean="0"/>
+                        <a:t>Call a more general function</a:t>
                       </a:r>
                       <a:endParaRPr lang="en-US" sz="3200" dirty="0"/>
                     </a:p>
@@ -11688,7 +11615,7 @@
     </p:spTree>
     <p:extLst>
       <p:ext uri="{BB962C8B-B14F-4D97-AF65-F5344CB8AC3E}">
-        <p14:creationId xmlns:p14="http://schemas.microsoft.com/office/powerpoint/2010/main" val="1041074975"/>
+        <p14:creationId xmlns:p14="http://schemas.microsoft.com/office/powerpoint/2010/main" val="2358874268"/>
       </p:ext>
     </p:extLst>
   </p:cSld>
@@ -11739,7 +11666,7 @@
           <a:p>
             <a:r>
               <a:rPr lang="en-US" dirty="0" smtClean="0"/>
-              <a:t>The Program Design Strategies</a:t>
+              <a:t>The Strategy Selection Recipe</a:t>
             </a:r>
             <a:endParaRPr lang="en-US" dirty="0"/>
           </a:p>
@@ -11755,14 +11682,14 @@
             <p:ph idx="1"/>
             <p:extLst>
               <p:ext uri="{D42A27DB-BD31-4B8C-83A1-F6EECF244321}">
-                <p14:modId xmlns:p14="http://schemas.microsoft.com/office/powerpoint/2010/main" val="1473467505"/>
+                <p14:modId xmlns:p14="http://schemas.microsoft.com/office/powerpoint/2010/main" val="2034017658"/>
               </p:ext>
             </p:extLst>
           </p:nvPr>
         </p:nvGraphicFramePr>
         <p:xfrm>
-          <a:off x="457200" y="1600200"/>
-          <a:ext cx="8229600" cy="5029200"/>
+          <a:off x="457200" y="1295400"/>
+          <a:ext cx="8153400" cy="5425440"/>
         </p:xfrm>
         <a:graphic>
           <a:graphicData uri="http://schemas.openxmlformats.org/drawingml/2006/table">
@@ -11771,8 +11698,7 @@
                 <a:tableStyleId>{5C22544A-7EE6-4342-B048-85BDC9FD1C3A}</a:tableStyleId>
               </a:tblPr>
               <a:tblGrid>
-                <a:gridCol w="4343400"/>
-                <a:gridCol w="3886200"/>
+                <a:gridCol w="8153400"/>
               </a:tblGrid>
               <a:tr h="370840">
                 <a:tc>
@@ -11781,25 +11707,6 @@
                     <a:lstStyle/>
                     <a:p>
                       <a:pPr algn="ctr"/>
-                      <a:r>
-                        <a:rPr lang="en-US" sz="3200" dirty="0" smtClean="0"/>
-                        <a:t>Design Strategy</a:t>
-                      </a:r>
-                      <a:endParaRPr lang="en-US" sz="3200" dirty="0"/>
-                    </a:p>
-                  </a:txBody>
-                  <a:tcPr/>
-                </a:tc>
-                <a:tc>
-                  <a:txBody>
-                    <a:bodyPr/>
-                    <a:lstStyle/>
-                    <a:p>
-                      <a:pPr algn="ctr"/>
-                      <a:r>
-                        <a:rPr lang="en-US" sz="3200" dirty="0" smtClean="0"/>
-                        <a:t>Use For</a:t>
-                      </a:r>
                       <a:endParaRPr lang="en-US" sz="3200" dirty="0"/>
                     </a:p>
                   </a:txBody>
@@ -11814,21 +11721,11 @@
                     <a:p>
                       <a:r>
                         <a:rPr lang="en-US" sz="3200" dirty="0" smtClean="0"/>
-                        <a:t>1. Function Composition</a:t>
-                      </a:r>
-                      <a:endParaRPr lang="en-US" sz="3200" dirty="0"/>
-                    </a:p>
-                  </a:txBody>
-                  <a:tcPr/>
-                </a:tc>
-                <a:tc>
-                  <a:txBody>
-                    <a:bodyPr/>
-                    <a:lstStyle/>
-                    <a:p>
-                      <a:r>
-                        <a:rPr lang="en-US" sz="3200" dirty="0" smtClean="0"/>
-                        <a:t>Any</a:t>
+                        <a:t>1. Can you build it using functions that you already have? (function</a:t>
+                      </a:r>
+                      <a:r>
+                        <a:rPr lang="en-US" sz="3200" baseline="0" dirty="0" smtClean="0"/>
+                        <a:t> composition)</a:t>
                       </a:r>
                       <a:endParaRPr lang="en-US" sz="3200" dirty="0"/>
                     </a:p>
@@ -11844,25 +11741,19 @@
                     <a:p>
                       <a:r>
                         <a:rPr lang="en-US" sz="3200" dirty="0" smtClean="0"/>
-                        <a:t>2. Cases</a:t>
-                      </a:r>
-                      <a:endParaRPr lang="en-US" sz="3200" dirty="0"/>
-                    </a:p>
-                  </a:txBody>
-                  <a:tcPr/>
-                </a:tc>
-                <a:tc>
-                  <a:txBody>
-                    <a:bodyPr/>
-                    <a:lstStyle/>
-                    <a:p>
-                      <a:r>
-                        <a:rPr lang="en-US" sz="3200" dirty="0" smtClean="0"/>
-                        <a:t>Scalar</a:t>
+                        <a:t>2. Can you build it by</a:t>
                       </a:r>
                       <a:r>
                         <a:rPr lang="en-US" sz="3200" baseline="0" dirty="0" smtClean="0"/>
-                        <a:t> or Itemization</a:t>
+                        <a:t> looking into one of </a:t>
+                      </a:r>
+                      <a:r>
+                        <a:rPr lang="en-US" sz="3200" baseline="0" smtClean="0"/>
+                        <a:t>the arguments? </a:t>
+                      </a:r>
+                      <a:r>
+                        <a:rPr lang="en-US" sz="3200" baseline="0" dirty="0" smtClean="0"/>
+                        <a:t>(structural decomposition)</a:t>
                       </a:r>
                       <a:endParaRPr lang="en-US" sz="3200" dirty="0"/>
                     </a:p>
@@ -11882,21 +11773,7 @@
                       </a:r>
                       <a:r>
                         <a:rPr lang="en-US" sz="3200" baseline="0" dirty="0" smtClean="0"/>
-                        <a:t> Parts</a:t>
-                      </a:r>
-                      <a:endParaRPr lang="en-US" sz="3200" dirty="0"/>
-                    </a:p>
-                  </a:txBody>
-                  <a:tcPr/>
-                </a:tc>
-                <a:tc>
-                  <a:txBody>
-                    <a:bodyPr/>
-                    <a:lstStyle/>
-                    <a:p>
-                      <a:r>
-                        <a:rPr lang="en-US" sz="3200" dirty="0" smtClean="0"/>
-                        <a:t>Compound</a:t>
+                        <a:t> Can you solve a more general problem? (generalization)</a:t>
                       </a:r>
                       <a:endParaRPr lang="en-US" sz="3200" dirty="0"/>
                     </a:p>
@@ -11912,29 +11789,13 @@
                     <a:p>
                       <a:r>
                         <a:rPr lang="en-US" sz="3200" dirty="0" smtClean="0"/>
-                        <a:t>4. Structural Decomposition</a:t>
-                      </a:r>
-                    </a:p>
-                  </a:txBody>
-                  <a:tcPr/>
-                </a:tc>
-                <a:tc>
-                  <a:txBody>
-                    <a:bodyPr/>
-                    <a:lstStyle/>
-                    <a:p>
-                      <a:r>
-                        <a:rPr lang="en-US" sz="3200" dirty="0" smtClean="0"/>
-                        <a:t>Mixed</a:t>
+                        <a:t>4. Is there a special-purpose</a:t>
                       </a:r>
                       <a:r>
                         <a:rPr lang="en-US" sz="3200" baseline="0" dirty="0" smtClean="0"/>
-                        <a:t> or</a:t>
-                      </a:r>
-                      <a:r>
-                        <a:rPr lang="en-US" sz="3200" dirty="0" smtClean="0"/>
-                        <a:t> Recursive</a:t>
-                      </a:r>
+                        <a:t> strategy you can use? </a:t>
+                      </a:r>
+                      <a:endParaRPr lang="en-US" sz="3200" dirty="0" smtClean="0"/>
                     </a:p>
                   </a:txBody>
                   <a:tcPr/>
@@ -11948,55 +11809,7 @@
                     <a:p>
                       <a:r>
                         <a:rPr lang="en-US" sz="3200" dirty="0" smtClean="0"/>
-                        <a:t>5. Generalization</a:t>
-                      </a:r>
-                      <a:endParaRPr lang="en-US" sz="3200" dirty="0"/>
-                    </a:p>
-                  </a:txBody>
-                  <a:tcPr/>
-                </a:tc>
-                <a:tc>
-                  <a:txBody>
-                    <a:bodyPr/>
-                    <a:lstStyle/>
-                    <a:p>
-                      <a:r>
-                        <a:rPr lang="en-US" sz="3200" dirty="0" smtClean="0"/>
-                        <a:t>Mixed</a:t>
-                      </a:r>
-                      <a:r>
-                        <a:rPr lang="en-US" sz="3200" baseline="0" dirty="0" smtClean="0"/>
-                        <a:t> or Recursive (usually)</a:t>
-                      </a:r>
-                      <a:endParaRPr lang="en-US" sz="3200" dirty="0"/>
-                    </a:p>
-                  </a:txBody>
-                  <a:tcPr/>
-                </a:tc>
-              </a:tr>
-              <a:tr h="370840">
-                <a:tc>
-                  <a:txBody>
-                    <a:bodyPr/>
-                    <a:lstStyle/>
-                    <a:p>
-                      <a:r>
-                        <a:rPr lang="en-US" sz="3200" dirty="0" smtClean="0"/>
-                        <a:t>6. General Recursion</a:t>
-                      </a:r>
-                      <a:endParaRPr lang="en-US" sz="3200" dirty="0"/>
-                    </a:p>
-                  </a:txBody>
-                  <a:tcPr/>
-                </a:tc>
-                <a:tc>
-                  <a:txBody>
-                    <a:bodyPr/>
-                    <a:lstStyle/>
-                    <a:p>
-                      <a:r>
-                        <a:rPr lang="en-US" sz="3200" dirty="0" smtClean="0"/>
-                        <a:t>Any</a:t>
+                        <a:t>5. If all else fails, try General Recursion</a:t>
                       </a:r>
                       <a:endParaRPr lang="en-US" sz="3200" dirty="0"/>
                     </a:p>
@@ -12031,62 +11844,10 @@
           </a:p>
         </p:txBody>
       </p:sp>
-      <p:sp>
-        <p:nvSpPr>
-          <p:cNvPr id="6" name="Cross 5"/>
-          <p:cNvSpPr/>
-          <p:nvPr/>
-        </p:nvSpPr>
-        <p:spPr>
-          <a:xfrm rot="2630932">
-            <a:off x="3124200" y="2743200"/>
-            <a:ext cx="2667000" cy="2667000"/>
-          </a:xfrm>
-          <a:prstGeom prst="plus">
-            <a:avLst>
-              <a:gd name="adj" fmla="val 40714"/>
-            </a:avLst>
-          </a:prstGeom>
-          <a:ln/>
-        </p:spPr>
-        <p:style>
-          <a:lnRef idx="2">
-            <a:schemeClr val="accent2">
-              <a:shade val="50000"/>
-            </a:schemeClr>
-          </a:lnRef>
-          <a:fillRef idx="1">
-            <a:schemeClr val="accent2"/>
-          </a:fillRef>
-          <a:effectRef idx="0">
-            <a:schemeClr val="accent2"/>
-          </a:effectRef>
-          <a:fontRef idx="minor">
-            <a:schemeClr val="lt1"/>
-          </a:fontRef>
-        </p:style>
-        <p:txBody>
-          <a:bodyPr rot="0" spcFirstLastPara="0" vertOverflow="overflow" horzOverflow="overflow" vert="horz" wrap="square" lIns="91440" tIns="45720" rIns="91440" bIns="45720" numCol="1" spcCol="0" rtlCol="0" fromWordArt="0" anchor="ctr" anchorCtr="0" forceAA="0" compatLnSpc="1">
-            <a:prstTxWarp prst="textNoShape">
-              <a:avLst/>
-            </a:prstTxWarp>
-            <a:noAutofit/>
-          </a:bodyPr>
-          <a:lstStyle/>
-          <a:p>
-            <a:pPr algn="ctr"/>
-            <a:endParaRPr lang="en-US" dirty="0">
-              <a:solidFill>
-                <a:schemeClr val="tx1"/>
-              </a:solidFill>
-            </a:endParaRPr>
-          </a:p>
-        </p:txBody>
-      </p:sp>
     </p:spTree>
     <p:extLst>
       <p:ext uri="{BB962C8B-B14F-4D97-AF65-F5344CB8AC3E}">
-        <p14:creationId xmlns:p14="http://schemas.microsoft.com/office/powerpoint/2010/main" val="775930123"/>
+        <p14:creationId xmlns:p14="http://schemas.microsoft.com/office/powerpoint/2010/main" val="2816001505"/>
       </p:ext>
     </p:extLst>
   </p:cSld>
@@ -12132,238 +11893,6 @@
         </p:nvSpPr>
         <p:spPr/>
         <p:txBody>
-          <a:bodyPr/>
-          <a:lstStyle/>
-          <a:p>
-            <a:r>
-              <a:rPr lang="en-US" dirty="0" smtClean="0"/>
-              <a:t>The Strategy Selection Recipe</a:t>
-            </a:r>
-            <a:endParaRPr lang="en-US" dirty="0"/>
-          </a:p>
-        </p:txBody>
-      </p:sp>
-      <p:graphicFrame>
-        <p:nvGraphicFramePr>
-          <p:cNvPr id="4" name="Content Placeholder 3"/>
-          <p:cNvGraphicFramePr>
-            <a:graphicFrameLocks noGrp="1"/>
-          </p:cNvGraphicFramePr>
-          <p:nvPr>
-            <p:ph idx="1"/>
-            <p:extLst>
-              <p:ext uri="{D42A27DB-BD31-4B8C-83A1-F6EECF244321}">
-                <p14:modId xmlns:p14="http://schemas.microsoft.com/office/powerpoint/2010/main" val="2034017658"/>
-              </p:ext>
-            </p:extLst>
-          </p:nvPr>
-        </p:nvGraphicFramePr>
-        <p:xfrm>
-          <a:off x="457200" y="1295400"/>
-          <a:ext cx="8153400" cy="5425440"/>
-        </p:xfrm>
-        <a:graphic>
-          <a:graphicData uri="http://schemas.openxmlformats.org/drawingml/2006/table">
-            <a:tbl>
-              <a:tblPr firstRow="1" bandRow="1">
-                <a:tableStyleId>{5C22544A-7EE6-4342-B048-85BDC9FD1C3A}</a:tableStyleId>
-              </a:tblPr>
-              <a:tblGrid>
-                <a:gridCol w="8153400"/>
-              </a:tblGrid>
-              <a:tr h="370840">
-                <a:tc>
-                  <a:txBody>
-                    <a:bodyPr/>
-                    <a:lstStyle/>
-                    <a:p>
-                      <a:pPr algn="ctr"/>
-                      <a:endParaRPr lang="en-US" sz="3200" dirty="0"/>
-                    </a:p>
-                  </a:txBody>
-                  <a:tcPr/>
-                </a:tc>
-              </a:tr>
-              <a:tr h="370840">
-                <a:tc>
-                  <a:txBody>
-                    <a:bodyPr/>
-                    <a:lstStyle/>
-                    <a:p>
-                      <a:r>
-                        <a:rPr lang="en-US" sz="3200" dirty="0" smtClean="0"/>
-                        <a:t>1. Can you build it using functions that you already have? (function</a:t>
-                      </a:r>
-                      <a:r>
-                        <a:rPr lang="en-US" sz="3200" baseline="0" dirty="0" smtClean="0"/>
-                        <a:t> composition)</a:t>
-                      </a:r>
-                      <a:endParaRPr lang="en-US" sz="3200" dirty="0"/>
-                    </a:p>
-                  </a:txBody>
-                  <a:tcPr/>
-                </a:tc>
-              </a:tr>
-              <a:tr h="370840">
-                <a:tc>
-                  <a:txBody>
-                    <a:bodyPr/>
-                    <a:lstStyle/>
-                    <a:p>
-                      <a:r>
-                        <a:rPr lang="en-US" sz="3200" dirty="0" smtClean="0"/>
-                        <a:t>2. Can you build it by</a:t>
-                      </a:r>
-                      <a:r>
-                        <a:rPr lang="en-US" sz="3200" baseline="0" dirty="0" smtClean="0"/>
-                        <a:t> looking into one of </a:t>
-                      </a:r>
-                      <a:r>
-                        <a:rPr lang="en-US" sz="3200" baseline="0" smtClean="0"/>
-                        <a:t>the arguments? </a:t>
-                      </a:r>
-                      <a:r>
-                        <a:rPr lang="en-US" sz="3200" baseline="0" dirty="0" smtClean="0"/>
-                        <a:t>(structural decomposition)</a:t>
-                      </a:r>
-                      <a:endParaRPr lang="en-US" sz="3200" dirty="0"/>
-                    </a:p>
-                  </a:txBody>
-                  <a:tcPr/>
-                </a:tc>
-              </a:tr>
-              <a:tr h="370840">
-                <a:tc>
-                  <a:txBody>
-                    <a:bodyPr/>
-                    <a:lstStyle/>
-                    <a:p>
-                      <a:r>
-                        <a:rPr lang="en-US" sz="3200" dirty="0" smtClean="0"/>
-                        <a:t>3.</a:t>
-                      </a:r>
-                      <a:r>
-                        <a:rPr lang="en-US" sz="3200" baseline="0" dirty="0" smtClean="0"/>
-                        <a:t> Can you solve a more general problem? (generalization)</a:t>
-                      </a:r>
-                      <a:endParaRPr lang="en-US" sz="3200" dirty="0"/>
-                    </a:p>
-                  </a:txBody>
-                  <a:tcPr/>
-                </a:tc>
-              </a:tr>
-              <a:tr h="370840">
-                <a:tc>
-                  <a:txBody>
-                    <a:bodyPr/>
-                    <a:lstStyle/>
-                    <a:p>
-                      <a:r>
-                        <a:rPr lang="en-US" sz="3200" dirty="0" smtClean="0"/>
-                        <a:t>4. Is there a special-purpose</a:t>
-                      </a:r>
-                      <a:r>
-                        <a:rPr lang="en-US" sz="3200" baseline="0" dirty="0" smtClean="0"/>
-                        <a:t> strategy you can use? </a:t>
-                      </a:r>
-                      <a:endParaRPr lang="en-US" sz="3200" dirty="0" smtClean="0"/>
-                    </a:p>
-                  </a:txBody>
-                  <a:tcPr/>
-                </a:tc>
-              </a:tr>
-              <a:tr h="370840">
-                <a:tc>
-                  <a:txBody>
-                    <a:bodyPr/>
-                    <a:lstStyle/>
-                    <a:p>
-                      <a:r>
-                        <a:rPr lang="en-US" sz="3200" dirty="0" smtClean="0"/>
-                        <a:t>5. If all else fails, try General Recursion</a:t>
-                      </a:r>
-                      <a:endParaRPr lang="en-US" sz="3200" dirty="0"/>
-                    </a:p>
-                  </a:txBody>
-                  <a:tcPr/>
-                </a:tc>
-              </a:tr>
-            </a:tbl>
-          </a:graphicData>
-        </a:graphic>
-      </p:graphicFrame>
-      <p:sp>
-        <p:nvSpPr>
-          <p:cNvPr id="3" name="Slide Number Placeholder 2"/>
-          <p:cNvSpPr>
-            <a:spLocks noGrp="1"/>
-          </p:cNvSpPr>
-          <p:nvPr>
-            <p:ph type="sldNum" sz="quarter" idx="12"/>
-          </p:nvPr>
-        </p:nvSpPr>
-        <p:spPr/>
-        <p:txBody>
-          <a:bodyPr/>
-          <a:lstStyle/>
-          <a:p>
-            <a:fld id="{2AF3B5EA-18B6-4040-9F78-6052AF49C681}" type="slidenum">
-              <a:rPr lang="en-US" smtClean="0"/>
-              <a:t>25</a:t>
-            </a:fld>
-            <a:endParaRPr lang="en-US"/>
-          </a:p>
-        </p:txBody>
-      </p:sp>
-    </p:spTree>
-    <p:extLst>
-      <p:ext uri="{BB962C8B-B14F-4D97-AF65-F5344CB8AC3E}">
-        <p14:creationId xmlns:p14="http://schemas.microsoft.com/office/powerpoint/2010/main" val="2816001505"/>
-      </p:ext>
-    </p:extLst>
-  </p:cSld>
-  <p:clrMapOvr>
-    <a:masterClrMapping/>
-  </p:clrMapOvr>
-  <p:timing>
-    <p:tnLst>
-      <p:par>
-        <p:cTn id="1" dur="indefinite" restart="never" nodeType="tmRoot"/>
-      </p:par>
-    </p:tnLst>
-  </p:timing>
-</p:sld>
-</file>
-
-<file path=ppt/slides/slide26.xml><?xml version="1.0" encoding="utf-8"?>
-<p:sld xmlns:a="http://schemas.openxmlformats.org/drawingml/2006/main" xmlns:r="http://schemas.openxmlformats.org/officeDocument/2006/relationships" xmlns:p="http://schemas.openxmlformats.org/presentationml/2006/main">
-  <p:cSld>
-    <p:spTree>
-      <p:nvGrpSpPr>
-        <p:cNvPr id="1" name=""/>
-        <p:cNvGrpSpPr/>
-        <p:nvPr/>
-      </p:nvGrpSpPr>
-      <p:grpSpPr>
-        <a:xfrm>
-          <a:off x="0" y="0"/>
-          <a:ext cx="0" cy="0"/>
-          <a:chOff x="0" y="0"/>
-          <a:chExt cx="0" cy="0"/>
-        </a:xfrm>
-      </p:grpSpPr>
-      <p:sp>
-        <p:nvSpPr>
-          <p:cNvPr id="2" name="Title 1"/>
-          <p:cNvSpPr>
-            <a:spLocks noGrp="1"/>
-          </p:cNvSpPr>
-          <p:nvPr>
-            <p:ph type="title"/>
-          </p:nvPr>
-        </p:nvSpPr>
-        <p:spPr/>
-        <p:txBody>
           <a:bodyPr>
             <a:normAutofit/>
           </a:bodyPr>
@@ -12659,7 +12188,7 @@
           <a:p>
             <a:fld id="{2AF3B5EA-18B6-4040-9F78-6052AF49C681}" type="slidenum">
               <a:rPr lang="en-US" smtClean="0"/>
-              <a:t>26</a:t>
+              <a:t>25</a:t>
             </a:fld>
             <a:endParaRPr lang="en-US"/>
           </a:p>
@@ -12685,7 +12214,7 @@
 </p:sld>
 </file>
 
-<file path=ppt/slides/slide27.xml><?xml version="1.0" encoding="utf-8"?>
+<file path=ppt/slides/slide26.xml><?xml version="1.0" encoding="utf-8"?>
 <p:sld xmlns:a="http://schemas.openxmlformats.org/drawingml/2006/main" xmlns:r="http://schemas.openxmlformats.org/officeDocument/2006/relationships" xmlns:p="http://schemas.openxmlformats.org/presentationml/2006/main">
   <p:cSld>
     <p:spTree>
@@ -12991,7 +12520,7 @@
           <a:p>
             <a:fld id="{2AF3B5EA-18B6-4040-9F78-6052AF49C681}" type="slidenum">
               <a:rPr lang="en-US" smtClean="0"/>
-              <a:t>27</a:t>
+              <a:t>26</a:t>
             </a:fld>
             <a:endParaRPr lang="en-US"/>
           </a:p>
@@ -13001,6 +12530,309 @@
     <p:extLst>
       <p:ext uri="{BB962C8B-B14F-4D97-AF65-F5344CB8AC3E}">
         <p14:creationId xmlns:p14="http://schemas.microsoft.com/office/powerpoint/2010/main" val="483285437"/>
+      </p:ext>
+    </p:extLst>
+  </p:cSld>
+  <p:clrMapOvr>
+    <a:masterClrMapping/>
+  </p:clrMapOvr>
+  <p:timing>
+    <p:tnLst>
+      <p:par>
+        <p:cTn id="1" dur="indefinite" restart="never" nodeType="tmRoot"/>
+      </p:par>
+    </p:tnLst>
+  </p:timing>
+</p:sld>
+</file>
+
+<file path=ppt/slides/slide27.xml><?xml version="1.0" encoding="utf-8"?>
+<p:sld xmlns:a="http://schemas.openxmlformats.org/drawingml/2006/main" xmlns:r="http://schemas.openxmlformats.org/officeDocument/2006/relationships" xmlns:p="http://schemas.openxmlformats.org/presentationml/2006/main">
+  <p:cSld>
+    <p:spTree>
+      <p:nvGrpSpPr>
+        <p:cNvPr id="1" name=""/>
+        <p:cNvGrpSpPr/>
+        <p:nvPr/>
+      </p:nvGrpSpPr>
+      <p:grpSpPr>
+        <a:xfrm>
+          <a:off x="0" y="0"/>
+          <a:ext cx="0" cy="0"/>
+          <a:chOff x="0" y="0"/>
+          <a:chExt cx="0" cy="0"/>
+        </a:xfrm>
+      </p:grpSpPr>
+      <p:sp>
+        <p:nvSpPr>
+          <p:cNvPr id="2" name="Title 1"/>
+          <p:cNvSpPr>
+            <a:spLocks noGrp="1"/>
+          </p:cNvSpPr>
+          <p:nvPr>
+            <p:ph type="title"/>
+          </p:nvPr>
+        </p:nvSpPr>
+        <p:spPr/>
+        <p:txBody>
+          <a:bodyPr/>
+          <a:lstStyle/>
+          <a:p>
+            <a:r>
+              <a:rPr lang="en-US" dirty="0" smtClean="0"/>
+              <a:t>How to Design Worlds</a:t>
+            </a:r>
+            <a:endParaRPr lang="en-US" dirty="0"/>
+          </a:p>
+        </p:txBody>
+      </p:sp>
+      <p:graphicFrame>
+        <p:nvGraphicFramePr>
+          <p:cNvPr id="4" name="Content Placeholder 3"/>
+          <p:cNvGraphicFramePr>
+            <a:graphicFrameLocks/>
+          </p:cNvGraphicFramePr>
+          <p:nvPr>
+            <p:extLst>
+              <p:ext uri="{D42A27DB-BD31-4B8C-83A1-F6EECF244321}">
+                <p14:modId xmlns:p14="http://schemas.microsoft.com/office/powerpoint/2010/main" val="3972999738"/>
+              </p:ext>
+            </p:extLst>
+          </p:nvPr>
+        </p:nvGraphicFramePr>
+        <p:xfrm>
+          <a:off x="457200" y="1600200"/>
+          <a:ext cx="8229600" cy="4480560"/>
+        </p:xfrm>
+        <a:graphic>
+          <a:graphicData uri="http://schemas.openxmlformats.org/drawingml/2006/table">
+            <a:tbl>
+              <a:tblPr firstRow="1" bandRow="1">
+                <a:tableStyleId>{5C22544A-7EE6-4342-B048-85BDC9FD1C3A}</a:tableStyleId>
+              </a:tblPr>
+              <a:tblGrid>
+                <a:gridCol w="8229600"/>
+              </a:tblGrid>
+              <a:tr h="370840">
+                <a:tc>
+                  <a:txBody>
+                    <a:bodyPr/>
+                    <a:lstStyle/>
+                    <a:p>
+                      <a:pPr algn="ctr"/>
+                      <a:r>
+                        <a:rPr lang="en-US" sz="2400" dirty="0" smtClean="0"/>
+                        <a:t>How to Design Universe Programs</a:t>
+                      </a:r>
+                      <a:endParaRPr lang="en-US" sz="2400" dirty="0"/>
+                    </a:p>
+                  </a:txBody>
+                  <a:tcPr/>
+                </a:tc>
+              </a:tr>
+              <a:tr h="1229360">
+                <a:tc>
+                  <a:txBody>
+                    <a:bodyPr/>
+                    <a:lstStyle/>
+                    <a:p>
+                      <a:pPr marL="342900" indent="-342900">
+                        <a:buAutoNum type="arabicPeriod"/>
+                      </a:pPr>
+                      <a:r>
+                        <a:rPr lang="en-US" sz="2400" baseline="0" dirty="0" smtClean="0"/>
+                        <a:t>Information Analysis</a:t>
+                      </a:r>
+                    </a:p>
+                    <a:p>
+                      <a:pPr marL="800100" lvl="1" indent="-342900">
+                        <a:buFont typeface="Arial" pitchFamily="34" charset="0"/>
+                        <a:buChar char="•"/>
+                      </a:pPr>
+                      <a:r>
+                        <a:rPr lang="en-US" sz="2400" baseline="0" dirty="0" smtClean="0"/>
+                        <a:t>What events should the world respond to?</a:t>
+                      </a:r>
+                    </a:p>
+                    <a:p>
+                      <a:pPr marL="800100" lvl="1" indent="-342900">
+                        <a:buFont typeface="Arial" pitchFamily="34" charset="0"/>
+                        <a:buChar char="•"/>
+                      </a:pPr>
+                      <a:r>
+                        <a:rPr lang="en-US" sz="2400" baseline="0" dirty="0" smtClean="0"/>
+                        <a:t>What information changes in response to an event?</a:t>
+                      </a:r>
+                    </a:p>
+                    <a:p>
+                      <a:pPr marL="800100" lvl="1" indent="-342900">
+                        <a:buFont typeface="Arial" pitchFamily="34" charset="0"/>
+                        <a:buChar char="•"/>
+                      </a:pPr>
+                      <a:r>
+                        <a:rPr lang="en-US" sz="2400" baseline="0" dirty="0" smtClean="0"/>
+                        <a:t>What information doesn't change in response to an event?</a:t>
+                      </a:r>
+                      <a:endParaRPr lang="en-US" sz="2400" dirty="0" smtClean="0"/>
+                    </a:p>
+                  </a:txBody>
+                  <a:tcPr/>
+                </a:tc>
+              </a:tr>
+              <a:tr h="370840">
+                <a:tc>
+                  <a:txBody>
+                    <a:bodyPr/>
+                    <a:lstStyle/>
+                    <a:p>
+                      <a:r>
+                        <a:rPr lang="en-US" sz="2400" dirty="0" smtClean="0"/>
+                        <a:t>2. From your information analysis, write out the constant definitions and data definitions.</a:t>
+                      </a:r>
+                      <a:endParaRPr lang="en-US" sz="2400" dirty="0"/>
+                    </a:p>
+                  </a:txBody>
+                  <a:tcPr/>
+                </a:tc>
+              </a:tr>
+              <a:tr h="370840">
+                <a:tc>
+                  <a:txBody>
+                    <a:bodyPr/>
+                    <a:lstStyle/>
+                    <a:p>
+                      <a:r>
+                        <a:rPr lang="en-US" sz="2400" dirty="0" smtClean="0"/>
+                        <a:t>3. From your list of events, write a </a:t>
+                      </a:r>
+                      <a:r>
+                        <a:rPr lang="en-US" sz="2400" dirty="0" err="1" smtClean="0"/>
+                        <a:t>wishlist</a:t>
+                      </a:r>
+                      <a:r>
+                        <a:rPr lang="en-US" sz="2400" dirty="0" smtClean="0"/>
+                        <a:t> of functions to be designed</a:t>
+                      </a:r>
+                      <a:endParaRPr lang="en-US" sz="2400" dirty="0"/>
+                    </a:p>
+                  </a:txBody>
+                  <a:tcPr/>
+                </a:tc>
+              </a:tr>
+              <a:tr h="370840">
+                <a:tc>
+                  <a:txBody>
+                    <a:bodyPr/>
+                    <a:lstStyle/>
+                    <a:p>
+                      <a:r>
+                        <a:rPr lang="en-US" sz="2400" dirty="0" smtClean="0"/>
+                        <a:t>4. Design the functions on your </a:t>
+                      </a:r>
+                      <a:r>
+                        <a:rPr lang="en-US" sz="2400" dirty="0" err="1" smtClean="0"/>
+                        <a:t>wishlist</a:t>
+                      </a:r>
+                      <a:r>
+                        <a:rPr lang="en-US" sz="2400" dirty="0" smtClean="0"/>
+                        <a:t> (use the design recipe!)</a:t>
+                      </a:r>
+                      <a:endParaRPr lang="en-US" sz="2400" dirty="0"/>
+                    </a:p>
+                  </a:txBody>
+                  <a:tcPr/>
+                </a:tc>
+              </a:tr>
+            </a:tbl>
+          </a:graphicData>
+        </a:graphic>
+      </p:graphicFrame>
+      <p:sp>
+        <p:nvSpPr>
+          <p:cNvPr id="6" name="Parallelogram 5"/>
+          <p:cNvSpPr/>
+          <p:nvPr/>
+        </p:nvSpPr>
+        <p:spPr>
+          <a:xfrm>
+            <a:off x="2590800" y="4876800"/>
+            <a:ext cx="3048000" cy="1447800"/>
+          </a:xfrm>
+          <a:prstGeom prst="parallelogram">
+            <a:avLst/>
+          </a:prstGeom>
+          <a:solidFill>
+            <a:srgbClr val="FFFF00"/>
+          </a:solidFill>
+          <a:ln/>
+        </p:spPr>
+        <p:style>
+          <a:lnRef idx="2">
+            <a:schemeClr val="accent1"/>
+          </a:lnRef>
+          <a:fillRef idx="1">
+            <a:schemeClr val="lt1"/>
+          </a:fillRef>
+          <a:effectRef idx="0">
+            <a:schemeClr val="accent1"/>
+          </a:effectRef>
+          <a:fontRef idx="minor">
+            <a:schemeClr val="dk1"/>
+          </a:fontRef>
+        </p:style>
+        <p:txBody>
+          <a:bodyPr rot="0" spcFirstLastPara="0" vertOverflow="overflow" horzOverflow="overflow" vert="horz" wrap="square" lIns="91440" tIns="45720" rIns="91440" bIns="45720" numCol="1" spcCol="0" rtlCol="0" fromWordArt="0" anchor="ctr" anchorCtr="0" forceAA="0" compatLnSpc="1">
+            <a:prstTxWarp prst="textNoShape">
+              <a:avLst/>
+            </a:prstTxWarp>
+            <a:noAutofit/>
+          </a:bodyPr>
+          <a:lstStyle/>
+          <a:p>
+            <a:pPr algn="ctr"/>
+            <a:r>
+              <a:rPr lang="en-US" dirty="0" smtClean="0">
+                <a:solidFill>
+                  <a:schemeClr val="tx1"/>
+                </a:solidFill>
+              </a:rPr>
+              <a:t>This is an instance of the System Design Recipe (!)</a:t>
+            </a:r>
+            <a:endParaRPr lang="en-US" dirty="0">
+              <a:solidFill>
+                <a:schemeClr val="tx1"/>
+              </a:solidFill>
+            </a:endParaRPr>
+          </a:p>
+        </p:txBody>
+      </p:sp>
+      <p:sp>
+        <p:nvSpPr>
+          <p:cNvPr id="3" name="Slide Number Placeholder 2"/>
+          <p:cNvSpPr>
+            <a:spLocks noGrp="1"/>
+          </p:cNvSpPr>
+          <p:nvPr>
+            <p:ph type="sldNum" sz="quarter" idx="12"/>
+          </p:nvPr>
+        </p:nvSpPr>
+        <p:spPr/>
+        <p:txBody>
+          <a:bodyPr/>
+          <a:lstStyle/>
+          <a:p>
+            <a:fld id="{2AF3B5EA-18B6-4040-9F78-6052AF49C681}" type="slidenum">
+              <a:rPr lang="en-US" smtClean="0"/>
+              <a:t>27</a:t>
+            </a:fld>
+            <a:endParaRPr lang="en-US"/>
+          </a:p>
+        </p:txBody>
+      </p:sp>
+    </p:spTree>
+    <p:extLst>
+      <p:ext uri="{BB962C8B-B14F-4D97-AF65-F5344CB8AC3E}">
+        <p14:creationId xmlns:p14="http://schemas.microsoft.com/office/powerpoint/2010/main" val="787565434"/>
       </p:ext>
     </p:extLst>
   </p:cSld>
@@ -13051,7 +12883,7 @@
           <a:p>
             <a:r>
               <a:rPr lang="en-US" dirty="0" smtClean="0"/>
-              <a:t>How to Design Worlds</a:t>
+              <a:t>The Iterative Design Recipe</a:t>
             </a:r>
             <a:endParaRPr lang="en-US" dirty="0"/>
           </a:p>
@@ -13061,19 +12893,16 @@
         <p:nvGraphicFramePr>
           <p:cNvPr id="4" name="Content Placeholder 3"/>
           <p:cNvGraphicFramePr>
-            <a:graphicFrameLocks/>
+            <a:graphicFrameLocks noGrp="1"/>
           </p:cNvGraphicFramePr>
           <p:nvPr>
-            <p:extLst>
-              <p:ext uri="{D42A27DB-BD31-4B8C-83A1-F6EECF244321}">
-                <p14:modId xmlns:p14="http://schemas.microsoft.com/office/powerpoint/2010/main" val="3972999738"/>
-              </p:ext>
-            </p:extLst>
+            <p:ph idx="1"/>
+            <p:extLst/>
           </p:nvPr>
         </p:nvGraphicFramePr>
         <p:xfrm>
           <a:off x="457200" y="1600200"/>
-          <a:ext cx="8229600" cy="4480560"/>
+          <a:ext cx="8229600" cy="5029200"/>
         </p:xfrm>
         <a:graphic>
           <a:graphicData uri="http://schemas.openxmlformats.org/drawingml/2006/table">
@@ -13090,61 +12919,11 @@
                     <a:bodyPr/>
                     <a:lstStyle/>
                     <a:p>
-                      <a:pPr algn="ctr"/>
-                      <a:r>
-                        <a:rPr lang="en-US" sz="2400" dirty="0" smtClean="0"/>
-                        <a:t>How to Design Universe Programs</a:t>
-                      </a:r>
-                      <a:endParaRPr lang="en-US" sz="2400" dirty="0"/>
-                    </a:p>
-                  </a:txBody>
-                  <a:tcPr/>
-                </a:tc>
-              </a:tr>
-              <a:tr h="1229360">
-                <a:tc>
-                  <a:txBody>
-                    <a:bodyPr/>
-                    <a:lstStyle/>
-                    <a:p>
-                      <a:pPr marL="342900" indent="-342900">
-                        <a:buAutoNum type="arabicPeriod"/>
-                      </a:pPr>
-                      <a:r>
-                        <a:rPr lang="en-US" sz="2400" baseline="0" dirty="0" smtClean="0"/>
-                        <a:t>Information Analysis</a:t>
-                      </a:r>
-                    </a:p>
-                    <a:p>
-                      <a:pPr marL="800100" lvl="1" indent="-342900">
-                        <a:buFont typeface="Arial" pitchFamily="34" charset="0"/>
-                        <a:buChar char="•"/>
-                      </a:pPr>
-                      <a:r>
-                        <a:rPr lang="en-US" sz="2400" baseline="0" dirty="0" smtClean="0"/>
-                        <a:t>What events should the world respond to?</a:t>
-                      </a:r>
-                    </a:p>
-                    <a:p>
-                      <a:pPr marL="800100" lvl="1" indent="-342900">
-                        <a:buFont typeface="Arial" pitchFamily="34" charset="0"/>
-                        <a:buChar char="•"/>
-                      </a:pPr>
-                      <a:r>
-                        <a:rPr lang="en-US" sz="2400" baseline="0" dirty="0" smtClean="0"/>
-                        <a:t>What information changes in response to an event?</a:t>
-                      </a:r>
-                    </a:p>
-                    <a:p>
-                      <a:pPr marL="800100" lvl="1" indent="-342900">
-                        <a:buFont typeface="Arial" pitchFamily="34" charset="0"/>
-                        <a:buChar char="•"/>
-                      </a:pPr>
-                      <a:r>
-                        <a:rPr lang="en-US" sz="2400" baseline="0" dirty="0" smtClean="0"/>
-                        <a:t>What information doesn't change in response to an event?</a:t>
-                      </a:r>
-                      <a:endParaRPr lang="en-US" sz="2400" dirty="0" smtClean="0"/>
+                      <a:r>
+                        <a:rPr lang="en-US" sz="3200" dirty="0" smtClean="0"/>
+                        <a:t>Adding a New Feature to an Existing Program</a:t>
+                      </a:r>
+                      <a:endParaRPr lang="en-US" sz="3200" dirty="0"/>
                     </a:p>
                   </a:txBody>
                   <a:tcPr/>
@@ -13156,11 +12935,17 @@
                     <a:bodyPr/>
                     <a:lstStyle/>
                     <a:p>
-                      <a:r>
-                        <a:rPr lang="en-US" sz="2400" dirty="0" smtClean="0"/>
-                        <a:t>2. From your information analysis, write out the constant definitions and data definitions.</a:t>
-                      </a:r>
-                      <a:endParaRPr lang="en-US" sz="2400" dirty="0"/>
+                      <a:pPr marL="0" indent="0">
+                        <a:buNone/>
+                      </a:pPr>
+                      <a:r>
+                        <a:rPr lang="en-US" sz="3200" dirty="0" smtClean="0"/>
+                        <a:t>1. Perform</a:t>
+                      </a:r>
+                      <a:r>
+                        <a:rPr lang="en-US" sz="3200" baseline="0" dirty="0" smtClean="0"/>
+                        <a:t> information analysis for new feature</a:t>
+                      </a:r>
                     </a:p>
                   </a:txBody>
                   <a:tcPr/>
@@ -13173,18 +12958,14 @@
                     <a:lstStyle/>
                     <a:p>
                       <a:r>
-                        <a:rPr lang="en-US" sz="2400" dirty="0" smtClean="0"/>
-                        <a:t>3. From your list of events, write a </a:t>
-                      </a:r>
-                      <a:r>
-                        <a:rPr lang="en-US" sz="2400" dirty="0" err="1" smtClean="0"/>
-                        <a:t>wishlist</a:t>
-                      </a:r>
-                      <a:r>
-                        <a:rPr lang="en-US" sz="2400" dirty="0" smtClean="0"/>
-                        <a:t> of functions to be designed</a:t>
-                      </a:r>
-                      <a:endParaRPr lang="en-US" sz="2400" dirty="0"/>
+                        <a:rPr lang="en-US" sz="3200" dirty="0" smtClean="0"/>
+                        <a:t>2. Modify data definitions</a:t>
+                      </a:r>
+                      <a:r>
+                        <a:rPr lang="en-US" sz="3200" baseline="0" dirty="0" smtClean="0"/>
+                        <a:t> as needed</a:t>
+                      </a:r>
+                      <a:endParaRPr lang="en-US" sz="3200" dirty="0"/>
                     </a:p>
                   </a:txBody>
                   <a:tcPr/>
@@ -13197,18 +12978,71 @@
                     <a:lstStyle/>
                     <a:p>
                       <a:r>
-                        <a:rPr lang="en-US" sz="2400" dirty="0" smtClean="0"/>
-                        <a:t>4. Design the functions on your </a:t>
-                      </a:r>
-                      <a:r>
-                        <a:rPr lang="en-US" sz="2400" dirty="0" err="1" smtClean="0"/>
+                        <a:rPr lang="en-US" sz="3200" dirty="0" smtClean="0"/>
+                        <a:t>3. Update existing functions to work with</a:t>
+                      </a:r>
+                      <a:r>
+                        <a:rPr lang="en-US" sz="3200" baseline="0" dirty="0" smtClean="0"/>
+                        <a:t> new data definitions</a:t>
+                      </a:r>
+                    </a:p>
+                  </a:txBody>
+                  <a:tcPr/>
+                </a:tc>
+              </a:tr>
+              <a:tr h="370840">
+                <a:tc>
+                  <a:txBody>
+                    <a:bodyPr/>
+                    <a:lstStyle/>
+                    <a:p>
+                      <a:r>
+                        <a:rPr lang="en-US" sz="3200" dirty="0" smtClean="0"/>
+                        <a:t>4. Write </a:t>
+                      </a:r>
+                      <a:r>
+                        <a:rPr lang="en-US" sz="3200" dirty="0" err="1" smtClean="0"/>
                         <a:t>wishlist</a:t>
                       </a:r>
                       <a:r>
-                        <a:rPr lang="en-US" sz="2400" dirty="0" smtClean="0"/>
-                        <a:t> (use the design recipe!)</a:t>
-                      </a:r>
-                      <a:endParaRPr lang="en-US" sz="2400" dirty="0"/>
+                        <a:rPr lang="en-US" sz="3200" dirty="0" smtClean="0"/>
+                        <a:t> of functions for new feature</a:t>
+                      </a:r>
+                      <a:endParaRPr lang="en-US" sz="3200" dirty="0"/>
+                    </a:p>
+                  </a:txBody>
+                  <a:tcPr/>
+                </a:tc>
+              </a:tr>
+              <a:tr h="370840">
+                <a:tc>
+                  <a:txBody>
+                    <a:bodyPr/>
+                    <a:lstStyle/>
+                    <a:p>
+                      <a:r>
+                        <a:rPr lang="en-US" sz="3200" dirty="0" smtClean="0"/>
+                        <a:t>5. Design new functions following the Design</a:t>
+                      </a:r>
+                      <a:r>
+                        <a:rPr lang="en-US" sz="3200" baseline="0" dirty="0" smtClean="0"/>
+                        <a:t> Recipe</a:t>
+                      </a:r>
+                    </a:p>
+                  </a:txBody>
+                  <a:tcPr/>
+                </a:tc>
+              </a:tr>
+              <a:tr h="370840">
+                <a:tc>
+                  <a:txBody>
+                    <a:bodyPr/>
+                    <a:lstStyle/>
+                    <a:p>
+                      <a:r>
+                        <a:rPr lang="en-US" sz="3200" baseline="0" dirty="0" smtClean="0"/>
+                        <a:t>6. Repeat for the next new feature</a:t>
+                      </a:r>
                     </a:p>
                   </a:txBody>
                   <a:tcPr/>
@@ -13220,65 +13054,6 @@
       </p:graphicFrame>
       <p:sp>
         <p:nvSpPr>
-          <p:cNvPr id="6" name="Parallelogram 5"/>
-          <p:cNvSpPr/>
-          <p:nvPr/>
-        </p:nvSpPr>
-        <p:spPr>
-          <a:xfrm>
-            <a:off x="2590800" y="4876800"/>
-            <a:ext cx="3048000" cy="1447800"/>
-          </a:xfrm>
-          <a:prstGeom prst="parallelogram">
-            <a:avLst/>
-          </a:prstGeom>
-          <a:solidFill>
-            <a:srgbClr val="FFFF00"/>
-          </a:solidFill>
-          <a:ln/>
-        </p:spPr>
-        <p:style>
-          <a:lnRef idx="2">
-            <a:schemeClr val="accent1"/>
-          </a:lnRef>
-          <a:fillRef idx="1">
-            <a:schemeClr val="lt1"/>
-          </a:fillRef>
-          <a:effectRef idx="0">
-            <a:schemeClr val="accent1"/>
-          </a:effectRef>
-          <a:fontRef idx="minor">
-            <a:schemeClr val="dk1"/>
-          </a:fontRef>
-        </p:style>
-        <p:txBody>
-          <a:bodyPr rot="0" spcFirstLastPara="0" vertOverflow="overflow" horzOverflow="overflow" vert="horz" wrap="square" lIns="91440" tIns="45720" rIns="91440" bIns="45720" numCol="1" spcCol="0" rtlCol="0" fromWordArt="0" anchor="ctr" anchorCtr="0" forceAA="0" compatLnSpc="1">
-            <a:prstTxWarp prst="textNoShape">
-              <a:avLst/>
-            </a:prstTxWarp>
-            <a:noAutofit/>
-          </a:bodyPr>
-          <a:lstStyle/>
-          <a:p>
-            <a:pPr algn="ctr"/>
-            <a:r>
-              <a:rPr lang="en-US" dirty="0" smtClean="0">
-                <a:solidFill>
-                  <a:schemeClr val="tx1"/>
-                </a:solidFill>
-              </a:rPr>
-              <a:t>This is an instance of the System Design Recipe (!)</a:t>
-            </a:r>
-            <a:endParaRPr lang="en-US" dirty="0">
-              <a:solidFill>
-                <a:schemeClr val="tx1"/>
-              </a:solidFill>
-            </a:endParaRPr>
-          </a:p>
-        </p:txBody>
-      </p:sp>
-      <p:sp>
-        <p:nvSpPr>
           <p:cNvPr id="3" name="Slide Number Placeholder 2"/>
           <p:cNvSpPr>
             <a:spLocks noGrp="1"/>
@@ -13303,7 +13078,7 @@
     </p:spTree>
     <p:extLst>
       <p:ext uri="{BB962C8B-B14F-4D97-AF65-F5344CB8AC3E}">
-        <p14:creationId xmlns:p14="http://schemas.microsoft.com/office/powerpoint/2010/main" val="787565434"/>
+        <p14:creationId xmlns:p14="http://schemas.microsoft.com/office/powerpoint/2010/main" val="1638683311"/>
       </p:ext>
     </p:extLst>
   </p:cSld>
@@ -13354,7 +13129,7 @@
           <a:p>
             <a:r>
               <a:rPr lang="en-US" dirty="0" smtClean="0"/>
-              <a:t>The Iterative Design Recipe</a:t>
+              <a:t>The Recursion Recipe</a:t>
             </a:r>
             <a:endParaRPr lang="en-US" dirty="0"/>
           </a:p>
@@ -13368,12 +13143,11 @@
           </p:cNvGraphicFramePr>
           <p:nvPr>
             <p:ph idx="1"/>
-            <p:extLst/>
           </p:nvPr>
         </p:nvGraphicFramePr>
         <p:xfrm>
           <a:off x="457200" y="1600200"/>
-          <a:ext cx="8229600" cy="5029200"/>
+          <a:ext cx="8229600" cy="3779520"/>
         </p:xfrm>
         <a:graphic>
           <a:graphicData uri="http://schemas.openxmlformats.org/drawingml/2006/table">
@@ -13390,9 +13164,14 @@
                     <a:bodyPr/>
                     <a:lstStyle/>
                     <a:p>
+                      <a:pPr algn="ctr"/>
                       <a:r>
                         <a:rPr lang="en-US" sz="3200" dirty="0" smtClean="0"/>
-                        <a:t>Adding a New Feature to an Existing Program</a:t>
+                        <a:t>Recursion</a:t>
+                      </a:r>
+                      <a:r>
+                        <a:rPr lang="en-US" sz="3200" baseline="0" dirty="0" smtClean="0"/>
+                        <a:t> and Self-Reference</a:t>
                       </a:r>
                       <a:endParaRPr lang="en-US" sz="3200" dirty="0"/>
                     </a:p>
@@ -13406,35 +13185,50 @@
                     <a:bodyPr/>
                     <a:lstStyle/>
                     <a:p>
-                      <a:pPr marL="0" indent="0">
+                      <a:pPr marL="0" marR="0" indent="0" algn="l" defTabSz="914400" rtl="0" eaLnBrk="1" fontAlgn="auto" latinLnBrk="0" hangingPunct="1">
+                        <a:lnSpc>
+                          <a:spcPct val="100000"/>
+                        </a:lnSpc>
+                        <a:spcBef>
+                          <a:spcPts val="0"/>
+                        </a:spcBef>
+                        <a:spcAft>
+                          <a:spcPts val="0"/>
+                        </a:spcAft>
+                        <a:buClrTx/>
+                        <a:buSzTx/>
+                        <a:buFontTx/>
                         <a:buNone/>
+                        <a:tabLst/>
+                        <a:defRPr/>
                       </a:pPr>
                       <a:r>
                         <a:rPr lang="en-US" sz="3200" dirty="0" smtClean="0"/>
-                        <a:t>1. Perform</a:t>
-                      </a:r>
-                      <a:r>
-                        <a:rPr lang="en-US" sz="3200" baseline="0" dirty="0" smtClean="0"/>
-                        <a:t> information analysis for new feature</a:t>
-                      </a:r>
-                    </a:p>
-                  </a:txBody>
-                  <a:tcPr/>
-                </a:tc>
-              </a:tr>
-              <a:tr h="370840">
-                <a:tc>
-                  <a:txBody>
-                    <a:bodyPr/>
-                    <a:lstStyle/>
-                    <a:p>
+                        <a:t>Represent arbitrary-sized information using a </a:t>
+                      </a:r>
+                      <a:r>
+                        <a:rPr lang="en-US" sz="3200" i="1" dirty="0" smtClean="0">
+                          <a:solidFill>
+                            <a:srgbClr val="FF0000"/>
+                          </a:solidFill>
+                        </a:rPr>
+                        <a:t>self-referential</a:t>
+                      </a:r>
                       <a:r>
                         <a:rPr lang="en-US" sz="3200" dirty="0" smtClean="0"/>
-                        <a:t>2. Modify data definitions</a:t>
-                      </a:r>
-                      <a:r>
-                        <a:rPr lang="en-US" sz="3200" baseline="0" dirty="0" smtClean="0"/>
-                        <a:t> as needed</a:t>
+                        <a:t> (or </a:t>
+                      </a:r>
+                      <a:r>
+                        <a:rPr lang="en-US" sz="3200" i="1" dirty="0" smtClean="0">
+                          <a:solidFill>
+                            <a:srgbClr val="FF0000"/>
+                          </a:solidFill>
+                        </a:rPr>
+                        <a:t>recursive</a:t>
+                      </a:r>
+                      <a:r>
+                        <a:rPr lang="en-US" sz="3200" dirty="0" smtClean="0"/>
+                        <a:t>) data definition.</a:t>
                       </a:r>
                       <a:endParaRPr lang="en-US" sz="3200" dirty="0"/>
                     </a:p>
@@ -13450,34 +13244,7 @@
                     <a:p>
                       <a:r>
                         <a:rPr lang="en-US" sz="3200" dirty="0" smtClean="0"/>
-                        <a:t>3. Update existing functions to work with</a:t>
-                      </a:r>
-                      <a:r>
-                        <a:rPr lang="en-US" sz="3200" baseline="0" dirty="0" smtClean="0"/>
-                        <a:t> new data definitions</a:t>
-                      </a:r>
-                    </a:p>
-                  </a:txBody>
-                  <a:tcPr/>
-                </a:tc>
-              </a:tr>
-              <a:tr h="370840">
-                <a:tc>
-                  <a:txBody>
-                    <a:bodyPr/>
-                    <a:lstStyle/>
-                    <a:p>
-                      <a:r>
-                        <a:rPr lang="en-US" sz="3200" dirty="0" smtClean="0"/>
-                        <a:t>4. Write </a:t>
-                      </a:r>
-                      <a:r>
-                        <a:rPr lang="en-US" sz="3200" dirty="0" err="1" smtClean="0"/>
-                        <a:t>wishlist</a:t>
-                      </a:r>
-                      <a:r>
-                        <a:rPr lang="en-US" sz="3200" dirty="0" smtClean="0"/>
-                        <a:t> of functions for new feature</a:t>
+                        <a:t>Self-reference in the data definition leads to self-reference in the template</a:t>
                       </a:r>
                       <a:endParaRPr lang="en-US" sz="3200" dirty="0"/>
                     </a:p>
@@ -13491,29 +13258,28 @@
                     <a:bodyPr/>
                     <a:lstStyle/>
                     <a:p>
+                      <a:pPr marL="0" marR="0" indent="0" algn="l" defTabSz="914400" rtl="0" eaLnBrk="1" fontAlgn="auto" latinLnBrk="0" hangingPunct="1">
+                        <a:lnSpc>
+                          <a:spcPct val="100000"/>
+                        </a:lnSpc>
+                        <a:spcBef>
+                          <a:spcPts val="0"/>
+                        </a:spcBef>
+                        <a:spcAft>
+                          <a:spcPts val="0"/>
+                        </a:spcAft>
+                        <a:buClrTx/>
+                        <a:buSzTx/>
+                        <a:buFontTx/>
+                        <a:buNone/>
+                        <a:tabLst/>
+                        <a:defRPr/>
+                      </a:pPr>
                       <a:r>
                         <a:rPr lang="en-US" sz="3200" dirty="0" smtClean="0"/>
-                        <a:t>5. Design new functions following the Design</a:t>
-                      </a:r>
-                      <a:r>
-                        <a:rPr lang="en-US" sz="3200" baseline="0" dirty="0" smtClean="0"/>
-                        <a:t> Recipe</a:t>
-                      </a:r>
-                    </a:p>
-                  </a:txBody>
-                  <a:tcPr/>
-                </a:tc>
-              </a:tr>
-              <a:tr h="370840">
-                <a:tc>
-                  <a:txBody>
-                    <a:bodyPr/>
-                    <a:lstStyle/>
-                    <a:p>
-                      <a:r>
-                        <a:rPr lang="en-US" sz="3200" baseline="0" dirty="0" smtClean="0"/>
-                        <a:t>6. Repeat for the next new feature</a:t>
-                      </a:r>
+                        <a:t>Self-reference in the template leads to self-reference in the code.</a:t>
+                      </a:r>
+                      <a:endParaRPr lang="en-US" sz="3200" dirty="0"/>
                     </a:p>
                   </a:txBody>
                   <a:tcPr/>
@@ -13549,7 +13315,7 @@
     </p:spTree>
     <p:extLst>
       <p:ext uri="{BB962C8B-B14F-4D97-AF65-F5344CB8AC3E}">
-        <p14:creationId xmlns:p14="http://schemas.microsoft.com/office/powerpoint/2010/main" val="1638683311"/>
+        <p14:creationId xmlns:p14="http://schemas.microsoft.com/office/powerpoint/2010/main" val="1269136783"/>
       </p:ext>
     </p:extLst>
   </p:cSld>
@@ -13702,7 +13468,7 @@
           <a:p>
             <a:r>
               <a:rPr lang="en-US" dirty="0" smtClean="0"/>
-              <a:t>The Recursion Recipe</a:t>
+              <a:t>Uses of Examples</a:t>
             </a:r>
             <a:endParaRPr lang="en-US" dirty="0"/>
           </a:p>
@@ -13716,11 +13482,16 @@
           </p:cNvGraphicFramePr>
           <p:nvPr>
             <p:ph idx="1"/>
+            <p:extLst>
+              <p:ext uri="{D42A27DB-BD31-4B8C-83A1-F6EECF244321}">
+                <p14:modId xmlns:p14="http://schemas.microsoft.com/office/powerpoint/2010/main" val="4283516127"/>
+              </p:ext>
+            </p:extLst>
           </p:nvPr>
         </p:nvGraphicFramePr>
         <p:xfrm>
           <a:off x="457200" y="1600200"/>
-          <a:ext cx="8229600" cy="3779520"/>
+          <a:ext cx="8229600" cy="3383280"/>
         </p:xfrm>
         <a:graphic>
           <a:graphicData uri="http://schemas.openxmlformats.org/drawingml/2006/table">
@@ -13740,11 +13511,7 @@
                       <a:pPr algn="ctr"/>
                       <a:r>
                         <a:rPr lang="en-US" sz="3200" dirty="0" smtClean="0"/>
-                        <a:t>Recursion</a:t>
-                      </a:r>
-                      <a:r>
-                        <a:rPr lang="en-US" sz="3200" baseline="0" dirty="0" smtClean="0"/>
-                        <a:t> and Self-Reference</a:t>
+                        <a:t>Uses of Examples</a:t>
                       </a:r>
                       <a:endParaRPr lang="en-US" sz="3200" dirty="0"/>
                     </a:p>
@@ -13758,50 +13525,35 @@
                     <a:bodyPr/>
                     <a:lstStyle/>
                     <a:p>
-                      <a:pPr marL="0" marR="0" indent="0" algn="l" defTabSz="914400" rtl="0" eaLnBrk="1" fontAlgn="auto" latinLnBrk="0" hangingPunct="1">
-                        <a:lnSpc>
-                          <a:spcPct val="100000"/>
-                        </a:lnSpc>
-                        <a:spcBef>
-                          <a:spcPts val="0"/>
-                        </a:spcBef>
-                        <a:spcAft>
-                          <a:spcPts val="0"/>
-                        </a:spcAft>
-                        <a:buClrTx/>
-                        <a:buSzTx/>
-                        <a:buFontTx/>
+                      <a:pPr marL="0" indent="0">
                         <a:buNone/>
-                        <a:tabLst/>
-                        <a:defRPr/>
                       </a:pPr>
                       <a:r>
                         <a:rPr lang="en-US" sz="3200" dirty="0" smtClean="0"/>
-                        <a:t>Represent arbitrary-sized information using a </a:t>
-                      </a:r>
-                      <a:r>
-                        <a:rPr lang="en-US" sz="3200" i="1" dirty="0" smtClean="0">
-                          <a:solidFill>
-                            <a:srgbClr val="FF0000"/>
-                          </a:solidFill>
-                        </a:rPr>
-                        <a:t>self-referential</a:t>
-                      </a:r>
+                        <a:t>1. Clarify purpose statement for</a:t>
+                      </a:r>
+                      <a:r>
+                        <a:rPr lang="en-US" sz="3200" baseline="0" dirty="0" smtClean="0"/>
+                        <a:t> YOU</a:t>
+                      </a:r>
+                    </a:p>
+                  </a:txBody>
+                  <a:tcPr/>
+                </a:tc>
+              </a:tr>
+              <a:tr h="370840">
+                <a:tc>
+                  <a:txBody>
+                    <a:bodyPr/>
+                    <a:lstStyle/>
+                    <a:p>
                       <a:r>
                         <a:rPr lang="en-US" sz="3200" dirty="0" smtClean="0"/>
-                        <a:t> (or </a:t>
-                      </a:r>
-                      <a:r>
-                        <a:rPr lang="en-US" sz="3200" i="1" dirty="0" smtClean="0">
-                          <a:solidFill>
-                            <a:srgbClr val="FF0000"/>
-                          </a:solidFill>
-                        </a:rPr>
-                        <a:t>recursive</a:t>
-                      </a:r>
-                      <a:r>
-                        <a:rPr lang="en-US" sz="3200" dirty="0" smtClean="0"/>
-                        <a:t>) data definition.</a:t>
+                        <a:t>2. Clarify purpose statement</a:t>
+                      </a:r>
+                      <a:r>
+                        <a:rPr lang="en-US" sz="3200" baseline="0" dirty="0" smtClean="0"/>
+                        <a:t> for the reader</a:t>
                       </a:r>
                       <a:endParaRPr lang="en-US" sz="3200" dirty="0"/>
                     </a:p>
@@ -13817,9 +13569,12 @@
                     <a:p>
                       <a:r>
                         <a:rPr lang="en-US" sz="3200" dirty="0" smtClean="0"/>
-                        <a:t>Self-reference in the data definition leads to self-reference in the template</a:t>
-                      </a:r>
-                      <a:endParaRPr lang="en-US" sz="3200" dirty="0"/>
+                        <a:t>3. Document calling sequence, etc., for the user</a:t>
+                      </a:r>
+                      <a:r>
+                        <a:rPr lang="en-US" sz="3200" baseline="0" dirty="0" smtClean="0"/>
+                        <a:t> (the person who will be calling this function)</a:t>
+                      </a:r>
                     </a:p>
                   </a:txBody>
                   <a:tcPr/>
@@ -13831,26 +13586,9 @@
                     <a:bodyPr/>
                     <a:lstStyle/>
                     <a:p>
-                      <a:pPr marL="0" marR="0" indent="0" algn="l" defTabSz="914400" rtl="0" eaLnBrk="1" fontAlgn="auto" latinLnBrk="0" hangingPunct="1">
-                        <a:lnSpc>
-                          <a:spcPct val="100000"/>
-                        </a:lnSpc>
-                        <a:spcBef>
-                          <a:spcPts val="0"/>
-                        </a:spcBef>
-                        <a:spcAft>
-                          <a:spcPts val="0"/>
-                        </a:spcAft>
-                        <a:buClrTx/>
-                        <a:buSzTx/>
-                        <a:buFontTx/>
-                        <a:buNone/>
-                        <a:tabLst/>
-                        <a:defRPr/>
-                      </a:pPr>
                       <a:r>
                         <a:rPr lang="en-US" sz="3200" dirty="0" smtClean="0"/>
-                        <a:t>Self-reference in the template leads to self-reference in the code.</a:t>
+                        <a:t>4. Serve as basis for acceptance tests</a:t>
                       </a:r>
                       <a:endParaRPr lang="en-US" sz="3200" dirty="0"/>
                     </a:p>
@@ -13888,7 +13626,7 @@
     </p:spTree>
     <p:extLst>
       <p:ext uri="{BB962C8B-B14F-4D97-AF65-F5344CB8AC3E}">
-        <p14:creationId xmlns:p14="http://schemas.microsoft.com/office/powerpoint/2010/main" val="1269136783"/>
+        <p14:creationId xmlns:p14="http://schemas.microsoft.com/office/powerpoint/2010/main" val="3511145810"/>
       </p:ext>
     </p:extLst>
   </p:cSld>
@@ -13939,215 +13677,6 @@
           <a:p>
             <a:r>
               <a:rPr lang="en-US" dirty="0" smtClean="0"/>
-              <a:t>Uses of Examples</a:t>
-            </a:r>
-            <a:endParaRPr lang="en-US" dirty="0"/>
-          </a:p>
-        </p:txBody>
-      </p:sp>
-      <p:graphicFrame>
-        <p:nvGraphicFramePr>
-          <p:cNvPr id="4" name="Content Placeholder 3"/>
-          <p:cNvGraphicFramePr>
-            <a:graphicFrameLocks noGrp="1"/>
-          </p:cNvGraphicFramePr>
-          <p:nvPr>
-            <p:ph idx="1"/>
-            <p:extLst>
-              <p:ext uri="{D42A27DB-BD31-4B8C-83A1-F6EECF244321}">
-                <p14:modId xmlns:p14="http://schemas.microsoft.com/office/powerpoint/2010/main" val="4283516127"/>
-              </p:ext>
-            </p:extLst>
-          </p:nvPr>
-        </p:nvGraphicFramePr>
-        <p:xfrm>
-          <a:off x="457200" y="1600200"/>
-          <a:ext cx="8229600" cy="3383280"/>
-        </p:xfrm>
-        <a:graphic>
-          <a:graphicData uri="http://schemas.openxmlformats.org/drawingml/2006/table">
-            <a:tbl>
-              <a:tblPr firstRow="1" bandRow="1">
-                <a:tableStyleId>{5C22544A-7EE6-4342-B048-85BDC9FD1C3A}</a:tableStyleId>
-              </a:tblPr>
-              <a:tblGrid>
-                <a:gridCol w="8229600"/>
-              </a:tblGrid>
-              <a:tr h="370840">
-                <a:tc>
-                  <a:txBody>
-                    <a:bodyPr/>
-                    <a:lstStyle/>
-                    <a:p>
-                      <a:pPr algn="ctr"/>
-                      <a:r>
-                        <a:rPr lang="en-US" sz="3200" dirty="0" smtClean="0"/>
-                        <a:t>Uses of Examples</a:t>
-                      </a:r>
-                      <a:endParaRPr lang="en-US" sz="3200" dirty="0"/>
-                    </a:p>
-                  </a:txBody>
-                  <a:tcPr/>
-                </a:tc>
-              </a:tr>
-              <a:tr h="370840">
-                <a:tc>
-                  <a:txBody>
-                    <a:bodyPr/>
-                    <a:lstStyle/>
-                    <a:p>
-                      <a:pPr marL="0" indent="0">
-                        <a:buNone/>
-                      </a:pPr>
-                      <a:r>
-                        <a:rPr lang="en-US" sz="3200" dirty="0" smtClean="0"/>
-                        <a:t>1. Clarify purpose statement for</a:t>
-                      </a:r>
-                      <a:r>
-                        <a:rPr lang="en-US" sz="3200" baseline="0" dirty="0" smtClean="0"/>
-                        <a:t> YOU</a:t>
-                      </a:r>
-                    </a:p>
-                  </a:txBody>
-                  <a:tcPr/>
-                </a:tc>
-              </a:tr>
-              <a:tr h="370840">
-                <a:tc>
-                  <a:txBody>
-                    <a:bodyPr/>
-                    <a:lstStyle/>
-                    <a:p>
-                      <a:r>
-                        <a:rPr lang="en-US" sz="3200" dirty="0" smtClean="0"/>
-                        <a:t>2. Clarify purpose statement</a:t>
-                      </a:r>
-                      <a:r>
-                        <a:rPr lang="en-US" sz="3200" baseline="0" dirty="0" smtClean="0"/>
-                        <a:t> for the reader</a:t>
-                      </a:r>
-                      <a:endParaRPr lang="en-US" sz="3200" dirty="0"/>
-                    </a:p>
-                  </a:txBody>
-                  <a:tcPr/>
-                </a:tc>
-              </a:tr>
-              <a:tr h="370840">
-                <a:tc>
-                  <a:txBody>
-                    <a:bodyPr/>
-                    <a:lstStyle/>
-                    <a:p>
-                      <a:r>
-                        <a:rPr lang="en-US" sz="3200" dirty="0" smtClean="0"/>
-                        <a:t>3. Document calling sequence, etc., for the user</a:t>
-                      </a:r>
-                      <a:r>
-                        <a:rPr lang="en-US" sz="3200" baseline="0" dirty="0" smtClean="0"/>
-                        <a:t> (the person who will be calling this function)</a:t>
-                      </a:r>
-                    </a:p>
-                  </a:txBody>
-                  <a:tcPr/>
-                </a:tc>
-              </a:tr>
-              <a:tr h="370840">
-                <a:tc>
-                  <a:txBody>
-                    <a:bodyPr/>
-                    <a:lstStyle/>
-                    <a:p>
-                      <a:r>
-                        <a:rPr lang="en-US" sz="3200" dirty="0" smtClean="0"/>
-                        <a:t>4. Serve as basis for acceptance tests</a:t>
-                      </a:r>
-                      <a:endParaRPr lang="en-US" sz="3200" dirty="0"/>
-                    </a:p>
-                  </a:txBody>
-                  <a:tcPr/>
-                </a:tc>
-              </a:tr>
-            </a:tbl>
-          </a:graphicData>
-        </a:graphic>
-      </p:graphicFrame>
-      <p:sp>
-        <p:nvSpPr>
-          <p:cNvPr id="3" name="Slide Number Placeholder 2"/>
-          <p:cNvSpPr>
-            <a:spLocks noGrp="1"/>
-          </p:cNvSpPr>
-          <p:nvPr>
-            <p:ph type="sldNum" sz="quarter" idx="12"/>
-          </p:nvPr>
-        </p:nvSpPr>
-        <p:spPr/>
-        <p:txBody>
-          <a:bodyPr/>
-          <a:lstStyle/>
-          <a:p>
-            <a:fld id="{2AF3B5EA-18B6-4040-9F78-6052AF49C681}" type="slidenum">
-              <a:rPr lang="en-US" smtClean="0"/>
-              <a:t>31</a:t>
-            </a:fld>
-            <a:endParaRPr lang="en-US"/>
-          </a:p>
-        </p:txBody>
-      </p:sp>
-    </p:spTree>
-    <p:extLst>
-      <p:ext uri="{BB962C8B-B14F-4D97-AF65-F5344CB8AC3E}">
-        <p14:creationId xmlns:p14="http://schemas.microsoft.com/office/powerpoint/2010/main" val="3511145810"/>
-      </p:ext>
-    </p:extLst>
-  </p:cSld>
-  <p:clrMapOvr>
-    <a:masterClrMapping/>
-  </p:clrMapOvr>
-  <p:timing>
-    <p:tnLst>
-      <p:par>
-        <p:cTn id="1" dur="indefinite" restart="never" nodeType="tmRoot"/>
-      </p:par>
-    </p:tnLst>
-  </p:timing>
-</p:sld>
-</file>
-
-<file path=ppt/slides/slide32.xml><?xml version="1.0" encoding="utf-8"?>
-<p:sld xmlns:a="http://schemas.openxmlformats.org/drawingml/2006/main" xmlns:r="http://schemas.openxmlformats.org/officeDocument/2006/relationships" xmlns:p="http://schemas.openxmlformats.org/presentationml/2006/main">
-  <p:cSld>
-    <p:spTree>
-      <p:nvGrpSpPr>
-        <p:cNvPr id="1" name=""/>
-        <p:cNvGrpSpPr/>
-        <p:nvPr/>
-      </p:nvGrpSpPr>
-      <p:grpSpPr>
-        <a:xfrm>
-          <a:off x="0" y="0"/>
-          <a:ext cx="0" cy="0"/>
-          <a:chOff x="0" y="0"/>
-          <a:chExt cx="0" cy="0"/>
-        </a:xfrm>
-      </p:grpSpPr>
-      <p:sp>
-        <p:nvSpPr>
-          <p:cNvPr id="2" name="Title 1"/>
-          <p:cNvSpPr>
-            <a:spLocks noGrp="1"/>
-          </p:cNvSpPr>
-          <p:nvPr>
-            <p:ph type="title"/>
-          </p:nvPr>
-        </p:nvSpPr>
-        <p:spPr/>
-        <p:txBody>
-          <a:bodyPr/>
-          <a:lstStyle/>
-          <a:p>
-            <a:r>
-              <a:rPr lang="en-US" dirty="0" smtClean="0"/>
               <a:t>The Program Review Recipe</a:t>
             </a:r>
             <a:endParaRPr lang="en-US" dirty="0"/>
@@ -14314,7 +13843,7 @@
           <a:p>
             <a:fld id="{2AF3B5EA-18B6-4040-9F78-6052AF49C681}" type="slidenum">
               <a:rPr lang="en-US" smtClean="0"/>
-              <a:t>32</a:t>
+              <a:t>31</a:t>
             </a:fld>
             <a:endParaRPr lang="en-US"/>
           </a:p>
@@ -14559,6 +14088,13 @@
   <p:clrMapOvr>
     <a:masterClrMapping/>
   </p:clrMapOvr>
+  <p:timing>
+    <p:tnLst>
+      <p:par>
+        <p:cTn id="1" dur="indefinite" restart="never" nodeType="tmRoot"/>
+      </p:par>
+    </p:tnLst>
+  </p:timing>
 </p:sld>
 </file>
 

</xml_diff>

<commit_message>
working on lessons 0.1-0.4
</commit_message>
<xml_diff>
--- a/Slides/Common Slides.pptx
+++ b/Slides/Common Slides.pptx
@@ -241,7 +241,7 @@
           <a:p>
             <a:fld id="{03B24962-D7B5-4FEA-ABE9-8C89DFE85AA1}" type="datetimeFigureOut">
               <a:rPr lang="en-US" smtClean="0"/>
-              <a:t>7/31/2015</a:t>
+              <a:t>8/1/2015</a:t>
             </a:fld>
             <a:endParaRPr lang="en-US"/>
           </a:p>
@@ -2002,7 +2002,7 @@
           <a:p>
             <a:fld id="{2F1F79F5-7BEC-496A-AFC7-876E38F64D71}" type="datetime1">
               <a:rPr lang="en-US" smtClean="0"/>
-              <a:t>7/31/2015</a:t>
+              <a:t>8/1/2015</a:t>
             </a:fld>
             <a:endParaRPr lang="en-US"/>
           </a:p>
@@ -2104,7 +2104,7 @@
           <a:p>
             <a:fld id="{0A05703A-7669-4FEA-9056-25299B4D29D4}" type="datetime1">
               <a:rPr lang="en-US" smtClean="0"/>
-              <a:t>7/31/2015</a:t>
+              <a:t>8/1/2015</a:t>
             </a:fld>
             <a:endParaRPr lang="en-US"/>
           </a:p>
@@ -2381,7 +2381,7 @@
           <a:p>
             <a:fld id="{6E5077B5-BB57-49DB-88CA-226A139E5C01}" type="datetime1">
               <a:rPr lang="en-US" smtClean="0"/>
-              <a:t>7/31/2015</a:t>
+              <a:t>8/1/2015</a:t>
             </a:fld>
             <a:endParaRPr lang="en-US"/>
           </a:p>
@@ -2634,7 +2634,7 @@
           <a:p>
             <a:fld id="{C48D9447-CBD6-49A1-89FD-8512A8CF8999}" type="datetime1">
               <a:rPr lang="en-US" smtClean="0"/>
-              <a:t>7/31/2015</a:t>
+              <a:t>8/1/2015</a:t>
             </a:fld>
             <a:endParaRPr lang="en-US"/>
           </a:p>
@@ -2804,7 +2804,7 @@
           <a:p>
             <a:fld id="{A3639A2A-823D-48B7-9ACE-7FAF42870BA9}" type="datetime1">
               <a:rPr lang="en-US" smtClean="0"/>
-              <a:t>7/31/2015</a:t>
+              <a:t>8/1/2015</a:t>
             </a:fld>
             <a:endParaRPr lang="en-US"/>
           </a:p>
@@ -2984,7 +2984,7 @@
           <a:p>
             <a:fld id="{ED1B6996-82E9-463C-972C-7B56056E426C}" type="datetime1">
               <a:rPr lang="en-US" smtClean="0"/>
-              <a:t>7/31/2015</a:t>
+              <a:t>8/1/2015</a:t>
             </a:fld>
             <a:endParaRPr lang="en-US"/>
           </a:p>
@@ -3072,16 +3072,22 @@
             <p:ph type="title"/>
           </p:nvPr>
         </p:nvSpPr>
-        <p:spPr/>
+        <p:spPr>
+          <a:ln w="28575">
+            <a:solidFill>
+              <a:schemeClr val="accent1"/>
+            </a:solidFill>
+          </a:ln>
+        </p:spPr>
         <p:txBody>
           <a:bodyPr/>
           <a:lstStyle/>
           <a:p>
             <a:r>
-              <a:rPr lang="en-US" smtClean="0"/>
+              <a:rPr lang="en-US" dirty="0" smtClean="0"/>
               <a:t>Click to edit Master title style</a:t>
             </a:r>
-            <a:endParaRPr lang="en-US"/>
+            <a:endParaRPr lang="en-US" dirty="0"/>
           </a:p>
         </p:txBody>
       </p:sp>
@@ -3154,7 +3160,7 @@
           <a:p>
             <a:fld id="{E22ED4DA-448D-4BB1-B935-CC112220207B}" type="datetime1">
               <a:rPr lang="en-US" smtClean="0"/>
-              <a:t>7/31/2015</a:t>
+              <a:t>8/1/2015</a:t>
             </a:fld>
             <a:endParaRPr lang="en-US"/>
           </a:p>
@@ -3336,7 +3342,7 @@
           <a:p>
             <a:fld id="{E22ED4DA-448D-4BB1-B935-CC112220207B}" type="datetime1">
               <a:rPr lang="en-US" smtClean="0"/>
-              <a:t>7/31/2015</a:t>
+              <a:t>8/1/2015</a:t>
             </a:fld>
             <a:endParaRPr lang="en-US"/>
           </a:p>
@@ -3605,7 +3611,7 @@
           <a:p>
             <a:fld id="{FF5D65A6-AB94-4435-B0B7-3743215FA46C}" type="datetime1">
               <a:rPr lang="en-US" smtClean="0"/>
-              <a:t>7/31/2015</a:t>
+              <a:t>8/1/2015</a:t>
             </a:fld>
             <a:endParaRPr lang="en-US"/>
           </a:p>
@@ -3790,7 +3796,7 @@
           <a:p>
             <a:fld id="{FF5D65A6-AB94-4435-B0B7-3743215FA46C}" type="datetime1">
               <a:rPr lang="en-US" smtClean="0"/>
-              <a:t>7/31/2015</a:t>
+              <a:t>8/1/2015</a:t>
             </a:fld>
             <a:endParaRPr lang="en-US"/>
           </a:p>
@@ -4092,7 +4098,7 @@
           <a:p>
             <a:fld id="{7C193DC4-6EF0-48C9-B29C-616106A645E1}" type="datetime1">
               <a:rPr lang="en-US" smtClean="0"/>
-              <a:t>7/31/2015</a:t>
+              <a:t>8/1/2015</a:t>
             </a:fld>
             <a:endParaRPr lang="en-US"/>
           </a:p>
@@ -4380,7 +4386,7 @@
           <a:p>
             <a:fld id="{5D1846AD-9252-4647-9435-4C2AC365653A}" type="datetime1">
               <a:rPr lang="en-US" smtClean="0"/>
-              <a:t>7/31/2015</a:t>
+              <a:t>8/1/2015</a:t>
             </a:fld>
             <a:endParaRPr lang="en-US"/>
           </a:p>
@@ -4802,7 +4808,7 @@
           <a:p>
             <a:fld id="{CE56DC10-3561-4063-A6AF-C1CC7A41040A}" type="datetime1">
               <a:rPr lang="en-US" smtClean="0"/>
-              <a:t>7/31/2015</a:t>
+              <a:t>8/1/2015</a:t>
             </a:fld>
             <a:endParaRPr lang="en-US"/>
           </a:p>
@@ -4920,7 +4926,7 @@
           <a:p>
             <a:fld id="{2F7B77F5-1464-4F6B-92A8-64FC8A508293}" type="datetime1">
               <a:rPr lang="en-US" smtClean="0"/>
-              <a:t>7/31/2015</a:t>
+              <a:t>8/1/2015</a:t>
             </a:fld>
             <a:endParaRPr lang="en-US"/>
           </a:p>
@@ -5140,7 +5146,7 @@
           <a:p>
             <a:fld id="{02B3F677-983B-48DB-ADFD-63FE6CBC7FB2}" type="datetime1">
               <a:rPr lang="en-US" smtClean="0"/>
-              <a:t>7/31/2015</a:t>
+              <a:t>8/1/2015</a:t>
             </a:fld>
             <a:endParaRPr lang="en-US"/>
           </a:p>
@@ -6061,14 +6067,14 @@
             <p:ph idx="1"/>
             <p:extLst>
               <p:ext uri="{D42A27DB-BD31-4B8C-83A1-F6EECF244321}">
-                <p14:modId xmlns:p14="http://schemas.microsoft.com/office/powerpoint/2010/main" val="556871473"/>
+                <p14:modId xmlns:p14="http://schemas.microsoft.com/office/powerpoint/2010/main" val="1712897319"/>
               </p:ext>
             </p:extLst>
           </p:nvPr>
         </p:nvGraphicFramePr>
         <p:xfrm>
-          <a:off x="457200" y="914400"/>
-          <a:ext cx="8229600" cy="4511040"/>
+          <a:off x="304800" y="914400"/>
+          <a:ext cx="8534400" cy="4023360"/>
         </p:xfrm>
         <a:graphic>
           <a:graphicData uri="http://schemas.openxmlformats.org/drawingml/2006/table">
@@ -6077,7 +6083,7 @@
                 <a:tableStyleId>{5C22544A-7EE6-4342-B048-85BDC9FD1C3A}</a:tableStyleId>
               </a:tblPr>
               <a:tblGrid>
-                <a:gridCol w="8229600"/>
+                <a:gridCol w="8534400"/>
               </a:tblGrid>
               <a:tr h="1066800">
                 <a:tc>
@@ -11544,11 +11550,7 @@
                     <a:p>
                       <a:r>
                         <a:rPr lang="en-US" sz="3200" dirty="0" smtClean="0"/>
-                        <a:t>5. Call a more general </a:t>
-                      </a:r>
-                      <a:r>
-                        <a:rPr lang="en-US" sz="3200" dirty="0" smtClean="0"/>
-                        <a:t>function</a:t>
+                        <a:t>5. Call a more general function</a:t>
                       </a:r>
                     </a:p>
                   </a:txBody>

</xml_diff>